<commit_message>
Intensité des notes et tempo
</commit_message>
<xml_diff>
--- a/Administratif/Visuel/Visuel.pptx
+++ b/Administratif/Visuel/Visuel.pptx
@@ -9,6 +9,7 @@
     <p:sldId id="258" r:id="rId3"/>
     <p:sldId id="262" r:id="rId4"/>
     <p:sldId id="260" r:id="rId5"/>
+    <p:sldId id="263" r:id="rId6"/>
   </p:sldIdLst>
   <p:sldSz cx="12192000" cy="6858000"/>
   <p:notesSz cx="6858000" cy="9144000"/>
@@ -246,7 +247,7 @@
           <a:p>
             <a:fld id="{A5DE0357-5E3B-455B-85D6-97D04540FA5A}" type="datetimeFigureOut">
               <a:rPr lang="en-US" smtClean="0"/>
-              <a:t>6/20/2016</a:t>
+              <a:t>6/21/2016</a:t>
             </a:fld>
             <a:endParaRPr lang="en-US"/>
           </a:p>
@@ -416,7 +417,7 @@
           <a:p>
             <a:fld id="{A5DE0357-5E3B-455B-85D6-97D04540FA5A}" type="datetimeFigureOut">
               <a:rPr lang="en-US" smtClean="0"/>
-              <a:t>6/20/2016</a:t>
+              <a:t>6/21/2016</a:t>
             </a:fld>
             <a:endParaRPr lang="en-US"/>
           </a:p>
@@ -596,7 +597,7 @@
           <a:p>
             <a:fld id="{A5DE0357-5E3B-455B-85D6-97D04540FA5A}" type="datetimeFigureOut">
               <a:rPr lang="en-US" smtClean="0"/>
-              <a:t>6/20/2016</a:t>
+              <a:t>6/21/2016</a:t>
             </a:fld>
             <a:endParaRPr lang="en-US"/>
           </a:p>
@@ -766,7 +767,7 @@
           <a:p>
             <a:fld id="{A5DE0357-5E3B-455B-85D6-97D04540FA5A}" type="datetimeFigureOut">
               <a:rPr lang="en-US" smtClean="0"/>
-              <a:t>6/20/2016</a:t>
+              <a:t>6/21/2016</a:t>
             </a:fld>
             <a:endParaRPr lang="en-US"/>
           </a:p>
@@ -1012,7 +1013,7 @@
           <a:p>
             <a:fld id="{A5DE0357-5E3B-455B-85D6-97D04540FA5A}" type="datetimeFigureOut">
               <a:rPr lang="en-US" smtClean="0"/>
-              <a:t>6/20/2016</a:t>
+              <a:t>6/21/2016</a:t>
             </a:fld>
             <a:endParaRPr lang="en-US"/>
           </a:p>
@@ -1244,7 +1245,7 @@
           <a:p>
             <a:fld id="{A5DE0357-5E3B-455B-85D6-97D04540FA5A}" type="datetimeFigureOut">
               <a:rPr lang="en-US" smtClean="0"/>
-              <a:t>6/20/2016</a:t>
+              <a:t>6/21/2016</a:t>
             </a:fld>
             <a:endParaRPr lang="en-US"/>
           </a:p>
@@ -1611,7 +1612,7 @@
           <a:p>
             <a:fld id="{A5DE0357-5E3B-455B-85D6-97D04540FA5A}" type="datetimeFigureOut">
               <a:rPr lang="en-US" smtClean="0"/>
-              <a:t>6/20/2016</a:t>
+              <a:t>6/21/2016</a:t>
             </a:fld>
             <a:endParaRPr lang="en-US"/>
           </a:p>
@@ -1729,7 +1730,7 @@
           <a:p>
             <a:fld id="{A5DE0357-5E3B-455B-85D6-97D04540FA5A}" type="datetimeFigureOut">
               <a:rPr lang="en-US" smtClean="0"/>
-              <a:t>6/20/2016</a:t>
+              <a:t>6/21/2016</a:t>
             </a:fld>
             <a:endParaRPr lang="en-US"/>
           </a:p>
@@ -1824,7 +1825,7 @@
           <a:p>
             <a:fld id="{A5DE0357-5E3B-455B-85D6-97D04540FA5A}" type="datetimeFigureOut">
               <a:rPr lang="en-US" smtClean="0"/>
-              <a:t>6/20/2016</a:t>
+              <a:t>6/21/2016</a:t>
             </a:fld>
             <a:endParaRPr lang="en-US"/>
           </a:p>
@@ -2101,7 +2102,7 @@
           <a:p>
             <a:fld id="{A5DE0357-5E3B-455B-85D6-97D04540FA5A}" type="datetimeFigureOut">
               <a:rPr lang="en-US" smtClean="0"/>
-              <a:t>6/20/2016</a:t>
+              <a:t>6/21/2016</a:t>
             </a:fld>
             <a:endParaRPr lang="en-US"/>
           </a:p>
@@ -2354,7 +2355,7 @@
           <a:p>
             <a:fld id="{A5DE0357-5E3B-455B-85D6-97D04540FA5A}" type="datetimeFigureOut">
               <a:rPr lang="en-US" smtClean="0"/>
-              <a:t>6/20/2016</a:t>
+              <a:t>6/21/2016</a:t>
             </a:fld>
             <a:endParaRPr lang="en-US"/>
           </a:p>
@@ -2567,7 +2568,7 @@
           <a:p>
             <a:fld id="{A5DE0357-5E3B-455B-85D6-97D04540FA5A}" type="datetimeFigureOut">
               <a:rPr lang="en-US" smtClean="0"/>
-              <a:t>6/20/2016</a:t>
+              <a:t>6/21/2016</a:t>
             </a:fld>
             <a:endParaRPr lang="en-US"/>
           </a:p>
@@ -3035,8 +3036,9 @@
             <a:avLst/>
           </a:prstGeom>
           <a:solidFill>
-            <a:schemeClr val="bg1">
+            <a:schemeClr val="tx1">
               <a:lumMod val="85000"/>
+              <a:lumOff val="15000"/>
             </a:schemeClr>
           </a:solidFill>
           <a:ln>
@@ -3082,7 +3084,14 @@
           <a:prstGeom prst="line">
             <a:avLst/>
           </a:prstGeom>
-          <a:ln w="19050"/>
+          <a:ln w="19050">
+            <a:solidFill>
+              <a:schemeClr val="tx1">
+                <a:lumMod val="65000"/>
+                <a:lumOff val="35000"/>
+              </a:schemeClr>
+            </a:solidFill>
+          </a:ln>
         </p:spPr>
         <p:style>
           <a:lnRef idx="1">
@@ -3514,13 +3523,13 @@
           <a:p>
             <a:pPr algn="r"/>
             <a:r>
-              <a:rPr lang="fr-CH" sz="2800" dirty="0" smtClean="0">
+              <a:rPr lang="fr-CH" sz="2000" dirty="0" smtClean="0">
                 <a:latin typeface="Segoe UI Light" panose="020B0502040204020203" pitchFamily="34" charset="0"/>
                 <a:cs typeface="Segoe UI Light" panose="020B0502040204020203" pitchFamily="34" charset="0"/>
               </a:rPr>
               <a:t>WOOPSA</a:t>
             </a:r>
-            <a:endParaRPr lang="en-US" sz="2800" dirty="0">
+            <a:endParaRPr lang="en-US" sz="2000" dirty="0">
               <a:latin typeface="Segoe UI Light" panose="020B0502040204020203" pitchFamily="34" charset="0"/>
               <a:cs typeface="Segoe UI Light" panose="020B0502040204020203" pitchFamily="34" charset="0"/>
             </a:endParaRPr>
@@ -3594,13 +3603,13 @@
           <a:p>
             <a:pPr algn="r"/>
             <a:r>
-              <a:rPr lang="fr-CH" sz="2800" dirty="0" smtClean="0">
+              <a:rPr lang="fr-CH" sz="2000" dirty="0" smtClean="0">
                 <a:latin typeface="Segoe UI Light" panose="020B0502040204020203" pitchFamily="34" charset="0"/>
                 <a:cs typeface="Segoe UI Light" panose="020B0502040204020203" pitchFamily="34" charset="0"/>
               </a:rPr>
               <a:t>Concept HMI</a:t>
             </a:r>
-            <a:endParaRPr lang="en-US" sz="2800" dirty="0">
+            <a:endParaRPr lang="en-US" sz="2000" dirty="0">
               <a:latin typeface="Segoe UI Light" panose="020B0502040204020203" pitchFamily="34" charset="0"/>
               <a:cs typeface="Segoe UI Light" panose="020B0502040204020203" pitchFamily="34" charset="0"/>
             </a:endParaRPr>
@@ -3650,13 +3659,13 @@
           <a:p>
             <a:pPr algn="r"/>
             <a:r>
-              <a:rPr lang="fr-CH" sz="2800" dirty="0" smtClean="0">
+              <a:rPr lang="fr-CH" sz="2000" dirty="0" smtClean="0">
                 <a:latin typeface="Segoe UI Light" panose="020B0502040204020203" pitchFamily="34" charset="0"/>
                 <a:cs typeface="Segoe UI Light" panose="020B0502040204020203" pitchFamily="34" charset="0"/>
               </a:rPr>
               <a:t>Art &amp; technologie</a:t>
             </a:r>
-            <a:endParaRPr lang="en-US" sz="2800" dirty="0">
+            <a:endParaRPr lang="en-US" sz="2000" dirty="0">
               <a:latin typeface="Segoe UI Light" panose="020B0502040204020203" pitchFamily="34" charset="0"/>
               <a:cs typeface="Segoe UI Light" panose="020B0502040204020203" pitchFamily="34" charset="0"/>
             </a:endParaRPr>
@@ -3706,13 +3715,13 @@
           <a:p>
             <a:pPr algn="r"/>
             <a:r>
-              <a:rPr lang="fr-CH" sz="2800" dirty="0" smtClean="0">
+              <a:rPr lang="fr-CH" sz="2000" dirty="0" smtClean="0">
                 <a:latin typeface="Segoe UI Light" panose="020B0502040204020203" pitchFamily="34" charset="0"/>
                 <a:cs typeface="Segoe UI Light" panose="020B0502040204020203" pitchFamily="34" charset="0"/>
               </a:rPr>
               <a:t>Web page</a:t>
             </a:r>
-            <a:endParaRPr lang="en-US" sz="2800" dirty="0">
+            <a:endParaRPr lang="en-US" sz="2000" dirty="0">
               <a:latin typeface="Segoe UI Light" panose="020B0502040204020203" pitchFamily="34" charset="0"/>
               <a:cs typeface="Segoe UI Light" panose="020B0502040204020203" pitchFamily="34" charset="0"/>
             </a:endParaRPr>
@@ -3792,13 +3801,13 @@
           <a:p>
             <a:pPr algn="r"/>
             <a:r>
-              <a:rPr lang="fr-CH" sz="2800" dirty="0" smtClean="0">
+              <a:rPr lang="fr-CH" sz="2000" dirty="0" smtClean="0">
                 <a:latin typeface="Segoe UI Light" panose="020B0502040204020203" pitchFamily="34" charset="0"/>
                 <a:cs typeface="Segoe UI Light" panose="020B0502040204020203" pitchFamily="34" charset="0"/>
               </a:rPr>
               <a:t>Smartphone</a:t>
             </a:r>
-            <a:endParaRPr lang="en-US" sz="2800" dirty="0">
+            <a:endParaRPr lang="en-US" sz="2000" dirty="0">
               <a:latin typeface="Segoe UI Light" panose="020B0502040204020203" pitchFamily="34" charset="0"/>
               <a:cs typeface="Segoe UI Light" panose="020B0502040204020203" pitchFamily="34" charset="0"/>
             </a:endParaRPr>
@@ -3848,13 +3857,13 @@
           <a:p>
             <a:pPr algn="r"/>
             <a:r>
-              <a:rPr lang="fr-CH" sz="2800" dirty="0" smtClean="0">
+              <a:rPr lang="fr-CH" sz="2000" dirty="0" smtClean="0">
                 <a:latin typeface="Segoe UI Light" panose="020B0502040204020203" pitchFamily="34" charset="0"/>
                 <a:cs typeface="Segoe UI Light" panose="020B0502040204020203" pitchFamily="34" charset="0"/>
               </a:rPr>
               <a:t>Wifi</a:t>
             </a:r>
-            <a:endParaRPr lang="en-US" sz="2800" dirty="0">
+            <a:endParaRPr lang="en-US" sz="2000" dirty="0">
               <a:latin typeface="Segoe UI Light" panose="020B0502040204020203" pitchFamily="34" charset="0"/>
               <a:cs typeface="Segoe UI Light" panose="020B0502040204020203" pitchFamily="34" charset="0"/>
             </a:endParaRPr>
@@ -8289,7 +8298,7 @@
         </p:blipFill>
         <p:spPr>
           <a:xfrm>
-            <a:off x="10638462" y="287506"/>
+            <a:off x="5121083" y="301882"/>
             <a:ext cx="388190" cy="388190"/>
           </a:xfrm>
           <a:prstGeom prst="rect">
@@ -8507,7 +8516,7 @@
         </p:nvSpPr>
         <p:spPr>
           <a:xfrm>
-            <a:off x="6131474" y="5925131"/>
+            <a:off x="5414042" y="5937354"/>
             <a:ext cx="1530928" cy="584630"/>
           </a:xfrm>
           <a:prstGeom prst="rect">
@@ -11034,8 +11043,8 @@
         </p:nvSpPr>
         <p:spPr>
           <a:xfrm>
-            <a:off x="7659602" y="6219073"/>
-            <a:ext cx="615600" cy="291600"/>
+            <a:off x="4798442" y="5934799"/>
+            <a:ext cx="615600" cy="575013"/>
           </a:xfrm>
           <a:prstGeom prst="rect">
             <a:avLst/>
@@ -11094,7 +11103,7 @@
         </p:blipFill>
         <p:spPr>
           <a:xfrm flipV="1">
-            <a:off x="7805392" y="6192153"/>
+            <a:off x="4944596" y="6048611"/>
             <a:ext cx="320623" cy="320623"/>
           </a:xfrm>
           <a:prstGeom prst="rect">
@@ -12157,8 +12166,8 @@
         </p:nvSpPr>
         <p:spPr>
           <a:xfrm>
-            <a:off x="7659602" y="5927473"/>
-            <a:ext cx="614800" cy="291600"/>
+            <a:off x="6940249" y="5937706"/>
+            <a:ext cx="614800" cy="572105"/>
           </a:xfrm>
           <a:prstGeom prst="rect">
             <a:avLst/>
@@ -12217,7 +12226,7 @@
         </p:blipFill>
         <p:spPr>
           <a:xfrm>
-            <a:off x="7805392" y="5899231"/>
+            <a:off x="7073181" y="6051519"/>
             <a:ext cx="320623" cy="320623"/>
           </a:xfrm>
           <a:prstGeom prst="rect">
@@ -12247,7 +12256,7 @@
         </p:blipFill>
         <p:spPr>
           <a:xfrm>
-            <a:off x="5155675" y="294723"/>
+            <a:off x="2007526" y="405041"/>
             <a:ext cx="390899" cy="390899"/>
           </a:xfrm>
           <a:prstGeom prst="rect">
@@ -12272,6 +12281,1504 @@
       </p:par>
     </p:tnLst>
   </p:timing>
+</p:sld>
+</file>
+
+<file path=ppt/slides/slide5.xml><?xml version="1.0" encoding="utf-8"?>
+<p:sld xmlns:a="http://schemas.openxmlformats.org/drawingml/2006/main" xmlns:r="http://schemas.openxmlformats.org/officeDocument/2006/relationships" xmlns:p="http://schemas.openxmlformats.org/presentationml/2006/main">
+  <p:cSld>
+    <p:spTree>
+      <p:nvGrpSpPr>
+        <p:cNvPr id="1" name=""/>
+        <p:cNvGrpSpPr/>
+        <p:nvPr/>
+      </p:nvGrpSpPr>
+      <p:grpSpPr>
+        <a:xfrm>
+          <a:off x="0" y="0"/>
+          <a:ext cx="0" cy="0"/>
+          <a:chOff x="0" y="0"/>
+          <a:chExt cx="0" cy="0"/>
+        </a:xfrm>
+      </p:grpSpPr>
+      <p:pic>
+        <p:nvPicPr>
+          <p:cNvPr id="4" name="Image 3"/>
+          <p:cNvPicPr>
+            <a:picLocks noChangeAspect="1"/>
+          </p:cNvPicPr>
+          <p:nvPr/>
+        </p:nvPicPr>
+        <p:blipFill>
+          <a:blip r:embed="rId2"/>
+          <a:stretch>
+            <a:fillRect/>
+          </a:stretch>
+        </p:blipFill>
+        <p:spPr>
+          <a:xfrm>
+            <a:off x="-1" y="0"/>
+            <a:ext cx="12194964" cy="6858000"/>
+          </a:xfrm>
+          <a:prstGeom prst="rect">
+            <a:avLst/>
+          </a:prstGeom>
+        </p:spPr>
+      </p:pic>
+      <p:sp>
+        <p:nvSpPr>
+          <p:cNvPr id="5" name="Rectangle 4"/>
+          <p:cNvSpPr/>
+          <p:nvPr/>
+        </p:nvSpPr>
+        <p:spPr>
+          <a:xfrm>
+            <a:off x="182356" y="4752834"/>
+            <a:ext cx="1800000" cy="324000"/>
+          </a:xfrm>
+          <a:prstGeom prst="rect">
+            <a:avLst/>
+          </a:prstGeom>
+          <a:solidFill>
+            <a:schemeClr val="bg1"/>
+          </a:solidFill>
+          <a:ln w="9525">
+            <a:solidFill>
+              <a:schemeClr val="tx1">
+                <a:lumMod val="95000"/>
+                <a:lumOff val="5000"/>
+              </a:schemeClr>
+            </a:solidFill>
+          </a:ln>
+        </p:spPr>
+        <p:style>
+          <a:lnRef idx="2">
+            <a:schemeClr val="accent1">
+              <a:shade val="50000"/>
+            </a:schemeClr>
+          </a:lnRef>
+          <a:fillRef idx="1">
+            <a:schemeClr val="accent1"/>
+          </a:fillRef>
+          <a:effectRef idx="0">
+            <a:schemeClr val="accent1"/>
+          </a:effectRef>
+          <a:fontRef idx="minor">
+            <a:schemeClr val="lt1"/>
+          </a:fontRef>
+        </p:style>
+        <p:txBody>
+          <a:bodyPr rtlCol="0" anchor="ctr"/>
+          <a:lstStyle/>
+          <a:p>
+            <a:pPr algn="r"/>
+            <a:r>
+              <a:rPr lang="fr-CH" sz="1200" dirty="0" smtClean="0">
+                <a:solidFill>
+                  <a:schemeClr val="tx1"/>
+                </a:solidFill>
+              </a:rPr>
+              <a:t>Mi</a:t>
+            </a:r>
+            <a:endParaRPr lang="en-US" sz="1200" dirty="0">
+              <a:solidFill>
+                <a:schemeClr val="tx1"/>
+              </a:solidFill>
+            </a:endParaRPr>
+          </a:p>
+        </p:txBody>
+      </p:sp>
+      <p:sp>
+        <p:nvSpPr>
+          <p:cNvPr id="6" name="Rectangle 5"/>
+          <p:cNvSpPr/>
+          <p:nvPr/>
+        </p:nvSpPr>
+        <p:spPr>
+          <a:xfrm>
+            <a:off x="182356" y="5076834"/>
+            <a:ext cx="1800000" cy="324000"/>
+          </a:xfrm>
+          <a:prstGeom prst="rect">
+            <a:avLst/>
+          </a:prstGeom>
+          <a:solidFill>
+            <a:schemeClr val="bg1"/>
+          </a:solidFill>
+          <a:ln w="9525">
+            <a:solidFill>
+              <a:schemeClr val="tx1">
+                <a:lumMod val="95000"/>
+                <a:lumOff val="5000"/>
+              </a:schemeClr>
+            </a:solidFill>
+          </a:ln>
+        </p:spPr>
+        <p:style>
+          <a:lnRef idx="2">
+            <a:schemeClr val="accent1">
+              <a:shade val="50000"/>
+            </a:schemeClr>
+          </a:lnRef>
+          <a:fillRef idx="1">
+            <a:schemeClr val="accent1"/>
+          </a:fillRef>
+          <a:effectRef idx="0">
+            <a:schemeClr val="accent1"/>
+          </a:effectRef>
+          <a:fontRef idx="minor">
+            <a:schemeClr val="lt1"/>
+          </a:fontRef>
+        </p:style>
+        <p:txBody>
+          <a:bodyPr rtlCol="0" anchor="ctr"/>
+          <a:lstStyle/>
+          <a:p>
+            <a:pPr algn="r"/>
+            <a:r>
+              <a:rPr lang="fr-CH" sz="1200" dirty="0" smtClean="0">
+                <a:solidFill>
+                  <a:schemeClr val="tx1"/>
+                </a:solidFill>
+              </a:rPr>
+              <a:t>RE</a:t>
+            </a:r>
+            <a:endParaRPr lang="en-US" sz="1200" dirty="0">
+              <a:solidFill>
+                <a:schemeClr val="tx1"/>
+              </a:solidFill>
+            </a:endParaRPr>
+          </a:p>
+        </p:txBody>
+      </p:sp>
+      <p:sp>
+        <p:nvSpPr>
+          <p:cNvPr id="7" name="Rectangle 6"/>
+          <p:cNvSpPr/>
+          <p:nvPr/>
+        </p:nvSpPr>
+        <p:spPr>
+          <a:xfrm>
+            <a:off x="182356" y="5400834"/>
+            <a:ext cx="1800000" cy="324000"/>
+          </a:xfrm>
+          <a:prstGeom prst="rect">
+            <a:avLst/>
+          </a:prstGeom>
+          <a:solidFill>
+            <a:schemeClr val="bg1"/>
+          </a:solidFill>
+          <a:ln w="9525">
+            <a:solidFill>
+              <a:schemeClr val="tx1">
+                <a:lumMod val="95000"/>
+                <a:lumOff val="5000"/>
+              </a:schemeClr>
+            </a:solidFill>
+          </a:ln>
+        </p:spPr>
+        <p:style>
+          <a:lnRef idx="2">
+            <a:schemeClr val="accent1">
+              <a:shade val="50000"/>
+            </a:schemeClr>
+          </a:lnRef>
+          <a:fillRef idx="1">
+            <a:schemeClr val="accent1"/>
+          </a:fillRef>
+          <a:effectRef idx="0">
+            <a:schemeClr val="accent1"/>
+          </a:effectRef>
+          <a:fontRef idx="minor">
+            <a:schemeClr val="lt1"/>
+          </a:fontRef>
+        </p:style>
+        <p:txBody>
+          <a:bodyPr rtlCol="0" anchor="ctr"/>
+          <a:lstStyle/>
+          <a:p>
+            <a:pPr algn="r"/>
+            <a:r>
+              <a:rPr lang="fr-CH" sz="1200" dirty="0" smtClean="0">
+                <a:solidFill>
+                  <a:schemeClr val="tx1"/>
+                </a:solidFill>
+              </a:rPr>
+              <a:t>DO</a:t>
+            </a:r>
+            <a:endParaRPr lang="en-US" sz="1200" dirty="0">
+              <a:solidFill>
+                <a:schemeClr val="tx1"/>
+              </a:solidFill>
+            </a:endParaRPr>
+          </a:p>
+        </p:txBody>
+      </p:sp>
+      <p:sp>
+        <p:nvSpPr>
+          <p:cNvPr id="8" name="Rectangle 7"/>
+          <p:cNvSpPr/>
+          <p:nvPr/>
+        </p:nvSpPr>
+        <p:spPr>
+          <a:xfrm>
+            <a:off x="182356" y="3778821"/>
+            <a:ext cx="1800000" cy="324000"/>
+          </a:xfrm>
+          <a:prstGeom prst="rect">
+            <a:avLst/>
+          </a:prstGeom>
+          <a:solidFill>
+            <a:schemeClr val="bg1"/>
+          </a:solidFill>
+          <a:ln w="9525">
+            <a:solidFill>
+              <a:schemeClr val="tx1">
+                <a:lumMod val="95000"/>
+                <a:lumOff val="5000"/>
+              </a:schemeClr>
+            </a:solidFill>
+          </a:ln>
+        </p:spPr>
+        <p:style>
+          <a:lnRef idx="2">
+            <a:schemeClr val="accent1">
+              <a:shade val="50000"/>
+            </a:schemeClr>
+          </a:lnRef>
+          <a:fillRef idx="1">
+            <a:schemeClr val="accent1"/>
+          </a:fillRef>
+          <a:effectRef idx="0">
+            <a:schemeClr val="accent1"/>
+          </a:effectRef>
+          <a:fontRef idx="minor">
+            <a:schemeClr val="lt1"/>
+          </a:fontRef>
+        </p:style>
+        <p:txBody>
+          <a:bodyPr rtlCol="0" anchor="ctr"/>
+          <a:lstStyle/>
+          <a:p>
+            <a:pPr algn="r"/>
+            <a:r>
+              <a:rPr lang="fr-CH" sz="1200" dirty="0" smtClean="0">
+                <a:solidFill>
+                  <a:schemeClr val="tx1"/>
+                </a:solidFill>
+              </a:rPr>
+              <a:t>LA</a:t>
+            </a:r>
+            <a:endParaRPr lang="en-US" sz="1200" dirty="0">
+              <a:solidFill>
+                <a:schemeClr val="tx1"/>
+              </a:solidFill>
+            </a:endParaRPr>
+          </a:p>
+        </p:txBody>
+      </p:sp>
+      <p:sp>
+        <p:nvSpPr>
+          <p:cNvPr id="9" name="Rectangle 8"/>
+          <p:cNvSpPr/>
+          <p:nvPr/>
+        </p:nvSpPr>
+        <p:spPr>
+          <a:xfrm>
+            <a:off x="182356" y="4099919"/>
+            <a:ext cx="1800000" cy="324000"/>
+          </a:xfrm>
+          <a:prstGeom prst="rect">
+            <a:avLst/>
+          </a:prstGeom>
+          <a:solidFill>
+            <a:schemeClr val="bg1"/>
+          </a:solidFill>
+          <a:ln w="9525">
+            <a:solidFill>
+              <a:schemeClr val="tx1">
+                <a:lumMod val="95000"/>
+                <a:lumOff val="5000"/>
+              </a:schemeClr>
+            </a:solidFill>
+          </a:ln>
+        </p:spPr>
+        <p:style>
+          <a:lnRef idx="2">
+            <a:schemeClr val="accent1">
+              <a:shade val="50000"/>
+            </a:schemeClr>
+          </a:lnRef>
+          <a:fillRef idx="1">
+            <a:schemeClr val="accent1"/>
+          </a:fillRef>
+          <a:effectRef idx="0">
+            <a:schemeClr val="accent1"/>
+          </a:effectRef>
+          <a:fontRef idx="minor">
+            <a:schemeClr val="lt1"/>
+          </a:fontRef>
+        </p:style>
+        <p:txBody>
+          <a:bodyPr rtlCol="0" anchor="ctr"/>
+          <a:lstStyle/>
+          <a:p>
+            <a:pPr algn="r"/>
+            <a:r>
+              <a:rPr lang="fr-CH" sz="1200" dirty="0" smtClean="0">
+                <a:solidFill>
+                  <a:schemeClr val="tx1"/>
+                </a:solidFill>
+              </a:rPr>
+              <a:t>SOL</a:t>
+            </a:r>
+            <a:endParaRPr lang="en-US" sz="1200" dirty="0">
+              <a:solidFill>
+                <a:schemeClr val="tx1"/>
+              </a:solidFill>
+            </a:endParaRPr>
+          </a:p>
+        </p:txBody>
+      </p:sp>
+      <p:sp>
+        <p:nvSpPr>
+          <p:cNvPr id="10" name="Rectangle 9"/>
+          <p:cNvSpPr/>
+          <p:nvPr/>
+        </p:nvSpPr>
+        <p:spPr>
+          <a:xfrm>
+            <a:off x="182356" y="4428834"/>
+            <a:ext cx="1800000" cy="324000"/>
+          </a:xfrm>
+          <a:prstGeom prst="rect">
+            <a:avLst/>
+          </a:prstGeom>
+          <a:solidFill>
+            <a:schemeClr val="bg1"/>
+          </a:solidFill>
+          <a:ln w="9525">
+            <a:solidFill>
+              <a:schemeClr val="tx1">
+                <a:lumMod val="95000"/>
+                <a:lumOff val="5000"/>
+              </a:schemeClr>
+            </a:solidFill>
+          </a:ln>
+        </p:spPr>
+        <p:style>
+          <a:lnRef idx="2">
+            <a:schemeClr val="accent1">
+              <a:shade val="50000"/>
+            </a:schemeClr>
+          </a:lnRef>
+          <a:fillRef idx="1">
+            <a:schemeClr val="accent1"/>
+          </a:fillRef>
+          <a:effectRef idx="0">
+            <a:schemeClr val="accent1"/>
+          </a:effectRef>
+          <a:fontRef idx="minor">
+            <a:schemeClr val="lt1"/>
+          </a:fontRef>
+        </p:style>
+        <p:txBody>
+          <a:bodyPr rtlCol="0" anchor="ctr"/>
+          <a:lstStyle/>
+          <a:p>
+            <a:pPr algn="r"/>
+            <a:r>
+              <a:rPr lang="fr-CH" sz="1200" dirty="0" smtClean="0">
+                <a:solidFill>
+                  <a:schemeClr val="tx1"/>
+                </a:solidFill>
+              </a:rPr>
+              <a:t>FA</a:t>
+            </a:r>
+            <a:endParaRPr lang="en-US" sz="1200" dirty="0">
+              <a:solidFill>
+                <a:schemeClr val="tx1"/>
+              </a:solidFill>
+            </a:endParaRPr>
+          </a:p>
+        </p:txBody>
+      </p:sp>
+      <p:sp>
+        <p:nvSpPr>
+          <p:cNvPr id="11" name="Rectangle 10"/>
+          <p:cNvSpPr/>
+          <p:nvPr/>
+        </p:nvSpPr>
+        <p:spPr>
+          <a:xfrm>
+            <a:off x="182356" y="3449906"/>
+            <a:ext cx="1800000" cy="324000"/>
+          </a:xfrm>
+          <a:prstGeom prst="rect">
+            <a:avLst/>
+          </a:prstGeom>
+          <a:solidFill>
+            <a:schemeClr val="bg1"/>
+          </a:solidFill>
+          <a:ln w="9525">
+            <a:solidFill>
+              <a:schemeClr val="tx1">
+                <a:lumMod val="95000"/>
+                <a:lumOff val="5000"/>
+              </a:schemeClr>
+            </a:solidFill>
+          </a:ln>
+        </p:spPr>
+        <p:style>
+          <a:lnRef idx="2">
+            <a:schemeClr val="accent1">
+              <a:shade val="50000"/>
+            </a:schemeClr>
+          </a:lnRef>
+          <a:fillRef idx="1">
+            <a:schemeClr val="accent1"/>
+          </a:fillRef>
+          <a:effectRef idx="0">
+            <a:schemeClr val="accent1"/>
+          </a:effectRef>
+          <a:fontRef idx="minor">
+            <a:schemeClr val="lt1"/>
+          </a:fontRef>
+        </p:style>
+        <p:txBody>
+          <a:bodyPr rtlCol="0" anchor="ctr"/>
+          <a:lstStyle/>
+          <a:p>
+            <a:pPr algn="r"/>
+            <a:r>
+              <a:rPr lang="fr-CH" sz="1200" dirty="0" smtClean="0">
+                <a:solidFill>
+                  <a:schemeClr val="tx1"/>
+                </a:solidFill>
+              </a:rPr>
+              <a:t>SI</a:t>
+            </a:r>
+            <a:endParaRPr lang="en-US" sz="1200" dirty="0">
+              <a:solidFill>
+                <a:schemeClr val="tx1"/>
+              </a:solidFill>
+            </a:endParaRPr>
+          </a:p>
+        </p:txBody>
+      </p:sp>
+      <p:sp>
+        <p:nvSpPr>
+          <p:cNvPr id="12" name="Rectangle 11"/>
+          <p:cNvSpPr/>
+          <p:nvPr/>
+        </p:nvSpPr>
+        <p:spPr>
+          <a:xfrm>
+            <a:off x="193557" y="5321342"/>
+            <a:ext cx="1008000" cy="180000"/>
+          </a:xfrm>
+          <a:prstGeom prst="rect">
+            <a:avLst/>
+          </a:prstGeom>
+          <a:solidFill>
+            <a:schemeClr val="tx1">
+              <a:lumMod val="95000"/>
+              <a:lumOff val="5000"/>
+            </a:schemeClr>
+          </a:solidFill>
+          <a:ln>
+            <a:noFill/>
+          </a:ln>
+        </p:spPr>
+        <p:style>
+          <a:lnRef idx="2">
+            <a:schemeClr val="accent1">
+              <a:shade val="50000"/>
+            </a:schemeClr>
+          </a:lnRef>
+          <a:fillRef idx="1">
+            <a:schemeClr val="accent1"/>
+          </a:fillRef>
+          <a:effectRef idx="0">
+            <a:schemeClr val="accent1"/>
+          </a:effectRef>
+          <a:fontRef idx="minor">
+            <a:schemeClr val="lt1"/>
+          </a:fontRef>
+        </p:style>
+        <p:txBody>
+          <a:bodyPr rtlCol="0" anchor="ctr"/>
+          <a:lstStyle/>
+          <a:p>
+            <a:pPr algn="ctr"/>
+            <a:r>
+              <a:rPr lang="fr-CH" sz="1200" dirty="0" smtClean="0"/>
+              <a:t>DO#</a:t>
+            </a:r>
+            <a:endParaRPr lang="en-US" sz="1200" dirty="0"/>
+          </a:p>
+        </p:txBody>
+      </p:sp>
+      <p:sp>
+        <p:nvSpPr>
+          <p:cNvPr id="13" name="Rectangle 12"/>
+          <p:cNvSpPr/>
+          <p:nvPr/>
+        </p:nvSpPr>
+        <p:spPr>
+          <a:xfrm>
+            <a:off x="193557" y="4991242"/>
+            <a:ext cx="1008000" cy="180000"/>
+          </a:xfrm>
+          <a:prstGeom prst="rect">
+            <a:avLst/>
+          </a:prstGeom>
+          <a:solidFill>
+            <a:schemeClr val="tx1">
+              <a:lumMod val="95000"/>
+              <a:lumOff val="5000"/>
+            </a:schemeClr>
+          </a:solidFill>
+          <a:ln>
+            <a:noFill/>
+          </a:ln>
+        </p:spPr>
+        <p:style>
+          <a:lnRef idx="2">
+            <a:schemeClr val="accent1">
+              <a:shade val="50000"/>
+            </a:schemeClr>
+          </a:lnRef>
+          <a:fillRef idx="1">
+            <a:schemeClr val="accent1"/>
+          </a:fillRef>
+          <a:effectRef idx="0">
+            <a:schemeClr val="accent1"/>
+          </a:effectRef>
+          <a:fontRef idx="minor">
+            <a:schemeClr val="lt1"/>
+          </a:fontRef>
+        </p:style>
+        <p:txBody>
+          <a:bodyPr rtlCol="0" anchor="ctr"/>
+          <a:lstStyle/>
+          <a:p>
+            <a:pPr algn="ctr"/>
+            <a:r>
+              <a:rPr lang="fr-CH" sz="1200" dirty="0" smtClean="0"/>
+              <a:t>RE</a:t>
+            </a:r>
+            <a:r>
+              <a:rPr lang="fr-CH" sz="1200" dirty="0"/>
+              <a:t> #</a:t>
+            </a:r>
+            <a:endParaRPr lang="en-US" sz="1200" dirty="0"/>
+          </a:p>
+        </p:txBody>
+      </p:sp>
+      <p:sp>
+        <p:nvSpPr>
+          <p:cNvPr id="14" name="Rectangle 13"/>
+          <p:cNvSpPr/>
+          <p:nvPr/>
+        </p:nvSpPr>
+        <p:spPr>
+          <a:xfrm>
+            <a:off x="193557" y="4340412"/>
+            <a:ext cx="1008000" cy="180000"/>
+          </a:xfrm>
+          <a:prstGeom prst="rect">
+            <a:avLst/>
+          </a:prstGeom>
+          <a:solidFill>
+            <a:schemeClr val="tx1">
+              <a:lumMod val="95000"/>
+              <a:lumOff val="5000"/>
+            </a:schemeClr>
+          </a:solidFill>
+          <a:ln>
+            <a:noFill/>
+          </a:ln>
+        </p:spPr>
+        <p:style>
+          <a:lnRef idx="2">
+            <a:schemeClr val="accent1">
+              <a:shade val="50000"/>
+            </a:schemeClr>
+          </a:lnRef>
+          <a:fillRef idx="1">
+            <a:schemeClr val="accent1"/>
+          </a:fillRef>
+          <a:effectRef idx="0">
+            <a:schemeClr val="accent1"/>
+          </a:effectRef>
+          <a:fontRef idx="minor">
+            <a:schemeClr val="lt1"/>
+          </a:fontRef>
+        </p:style>
+        <p:txBody>
+          <a:bodyPr rtlCol="0" anchor="ctr"/>
+          <a:lstStyle/>
+          <a:p>
+            <a:pPr algn="ctr"/>
+            <a:r>
+              <a:rPr lang="fr-CH" sz="1200" dirty="0" smtClean="0"/>
+              <a:t>FA</a:t>
+            </a:r>
+            <a:r>
+              <a:rPr lang="fr-CH" sz="1200" dirty="0"/>
+              <a:t> #</a:t>
+            </a:r>
+            <a:endParaRPr lang="en-US" sz="1200" dirty="0"/>
+          </a:p>
+        </p:txBody>
+      </p:sp>
+      <p:sp>
+        <p:nvSpPr>
+          <p:cNvPr id="15" name="Rectangle 14"/>
+          <p:cNvSpPr/>
+          <p:nvPr/>
+        </p:nvSpPr>
+        <p:spPr>
+          <a:xfrm>
+            <a:off x="193557" y="4016114"/>
+            <a:ext cx="1008000" cy="180000"/>
+          </a:xfrm>
+          <a:prstGeom prst="rect">
+            <a:avLst/>
+          </a:prstGeom>
+          <a:solidFill>
+            <a:schemeClr val="tx1">
+              <a:lumMod val="95000"/>
+              <a:lumOff val="5000"/>
+            </a:schemeClr>
+          </a:solidFill>
+          <a:ln>
+            <a:noFill/>
+          </a:ln>
+        </p:spPr>
+        <p:style>
+          <a:lnRef idx="2">
+            <a:schemeClr val="accent1">
+              <a:shade val="50000"/>
+            </a:schemeClr>
+          </a:lnRef>
+          <a:fillRef idx="1">
+            <a:schemeClr val="accent1"/>
+          </a:fillRef>
+          <a:effectRef idx="0">
+            <a:schemeClr val="accent1"/>
+          </a:effectRef>
+          <a:fontRef idx="minor">
+            <a:schemeClr val="lt1"/>
+          </a:fontRef>
+        </p:style>
+        <p:txBody>
+          <a:bodyPr rtlCol="0" anchor="ctr"/>
+          <a:lstStyle/>
+          <a:p>
+            <a:pPr algn="ctr"/>
+            <a:r>
+              <a:rPr lang="fr-CH" sz="1200" dirty="0" smtClean="0"/>
+              <a:t>SOL</a:t>
+            </a:r>
+            <a:r>
+              <a:rPr lang="fr-CH" sz="1200" dirty="0"/>
+              <a:t> #</a:t>
+            </a:r>
+            <a:endParaRPr lang="en-US" sz="1200" dirty="0"/>
+          </a:p>
+        </p:txBody>
+      </p:sp>
+      <p:sp>
+        <p:nvSpPr>
+          <p:cNvPr id="16" name="Rectangle 15"/>
+          <p:cNvSpPr/>
+          <p:nvPr/>
+        </p:nvSpPr>
+        <p:spPr>
+          <a:xfrm>
+            <a:off x="193557" y="3696427"/>
+            <a:ext cx="1008000" cy="180000"/>
+          </a:xfrm>
+          <a:prstGeom prst="rect">
+            <a:avLst/>
+          </a:prstGeom>
+          <a:solidFill>
+            <a:schemeClr val="tx1">
+              <a:lumMod val="95000"/>
+              <a:lumOff val="5000"/>
+            </a:schemeClr>
+          </a:solidFill>
+          <a:ln>
+            <a:noFill/>
+          </a:ln>
+        </p:spPr>
+        <p:style>
+          <a:lnRef idx="2">
+            <a:schemeClr val="accent1">
+              <a:shade val="50000"/>
+            </a:schemeClr>
+          </a:lnRef>
+          <a:fillRef idx="1">
+            <a:schemeClr val="accent1"/>
+          </a:fillRef>
+          <a:effectRef idx="0">
+            <a:schemeClr val="accent1"/>
+          </a:effectRef>
+          <a:fontRef idx="minor">
+            <a:schemeClr val="lt1"/>
+          </a:fontRef>
+        </p:style>
+        <p:txBody>
+          <a:bodyPr rtlCol="0" anchor="ctr"/>
+          <a:lstStyle/>
+          <a:p>
+            <a:pPr algn="ctr"/>
+            <a:r>
+              <a:rPr lang="fr-CH" sz="1200" dirty="0" smtClean="0"/>
+              <a:t>LA</a:t>
+            </a:r>
+            <a:r>
+              <a:rPr lang="fr-CH" sz="1200" dirty="0"/>
+              <a:t> #</a:t>
+            </a:r>
+            <a:endParaRPr lang="en-US" sz="1200" dirty="0"/>
+          </a:p>
+        </p:txBody>
+      </p:sp>
+      <p:sp>
+        <p:nvSpPr>
+          <p:cNvPr id="42" name="Rectangle 41"/>
+          <p:cNvSpPr/>
+          <p:nvPr/>
+        </p:nvSpPr>
+        <p:spPr>
+          <a:xfrm>
+            <a:off x="182356" y="2476696"/>
+            <a:ext cx="1800000" cy="324000"/>
+          </a:xfrm>
+          <a:prstGeom prst="rect">
+            <a:avLst/>
+          </a:prstGeom>
+          <a:solidFill>
+            <a:schemeClr val="bg1"/>
+          </a:solidFill>
+          <a:ln w="9525">
+            <a:solidFill>
+              <a:schemeClr val="tx1">
+                <a:lumMod val="95000"/>
+                <a:lumOff val="5000"/>
+              </a:schemeClr>
+            </a:solidFill>
+          </a:ln>
+        </p:spPr>
+        <p:style>
+          <a:lnRef idx="2">
+            <a:schemeClr val="accent1">
+              <a:shade val="50000"/>
+            </a:schemeClr>
+          </a:lnRef>
+          <a:fillRef idx="1">
+            <a:schemeClr val="accent1"/>
+          </a:fillRef>
+          <a:effectRef idx="0">
+            <a:schemeClr val="accent1"/>
+          </a:effectRef>
+          <a:fontRef idx="minor">
+            <a:schemeClr val="lt1"/>
+          </a:fontRef>
+        </p:style>
+        <p:txBody>
+          <a:bodyPr rtlCol="0" anchor="ctr"/>
+          <a:lstStyle/>
+          <a:p>
+            <a:pPr algn="r"/>
+            <a:r>
+              <a:rPr lang="fr-CH" sz="1200" dirty="0" smtClean="0">
+                <a:solidFill>
+                  <a:schemeClr val="tx1"/>
+                </a:solidFill>
+              </a:rPr>
+              <a:t>Mi</a:t>
+            </a:r>
+            <a:endParaRPr lang="en-US" sz="1200" dirty="0">
+              <a:solidFill>
+                <a:schemeClr val="tx1"/>
+              </a:solidFill>
+            </a:endParaRPr>
+          </a:p>
+        </p:txBody>
+      </p:sp>
+      <p:sp>
+        <p:nvSpPr>
+          <p:cNvPr id="43" name="Rectangle 42"/>
+          <p:cNvSpPr/>
+          <p:nvPr/>
+        </p:nvSpPr>
+        <p:spPr>
+          <a:xfrm>
+            <a:off x="182356" y="2800696"/>
+            <a:ext cx="1800000" cy="324000"/>
+          </a:xfrm>
+          <a:prstGeom prst="rect">
+            <a:avLst/>
+          </a:prstGeom>
+          <a:solidFill>
+            <a:schemeClr val="bg1"/>
+          </a:solidFill>
+          <a:ln w="9525">
+            <a:solidFill>
+              <a:schemeClr val="tx1">
+                <a:lumMod val="95000"/>
+                <a:lumOff val="5000"/>
+              </a:schemeClr>
+            </a:solidFill>
+          </a:ln>
+        </p:spPr>
+        <p:style>
+          <a:lnRef idx="2">
+            <a:schemeClr val="accent1">
+              <a:shade val="50000"/>
+            </a:schemeClr>
+          </a:lnRef>
+          <a:fillRef idx="1">
+            <a:schemeClr val="accent1"/>
+          </a:fillRef>
+          <a:effectRef idx="0">
+            <a:schemeClr val="accent1"/>
+          </a:effectRef>
+          <a:fontRef idx="minor">
+            <a:schemeClr val="lt1"/>
+          </a:fontRef>
+        </p:style>
+        <p:txBody>
+          <a:bodyPr rtlCol="0" anchor="ctr"/>
+          <a:lstStyle/>
+          <a:p>
+            <a:pPr algn="r"/>
+            <a:r>
+              <a:rPr lang="fr-CH" sz="1200" dirty="0" smtClean="0">
+                <a:solidFill>
+                  <a:schemeClr val="tx1"/>
+                </a:solidFill>
+              </a:rPr>
+              <a:t>RE</a:t>
+            </a:r>
+            <a:endParaRPr lang="en-US" sz="1200" dirty="0">
+              <a:solidFill>
+                <a:schemeClr val="tx1"/>
+              </a:solidFill>
+            </a:endParaRPr>
+          </a:p>
+        </p:txBody>
+      </p:sp>
+      <p:sp>
+        <p:nvSpPr>
+          <p:cNvPr id="44" name="Rectangle 43"/>
+          <p:cNvSpPr/>
+          <p:nvPr/>
+        </p:nvSpPr>
+        <p:spPr>
+          <a:xfrm>
+            <a:off x="182356" y="3124696"/>
+            <a:ext cx="1800000" cy="324000"/>
+          </a:xfrm>
+          <a:prstGeom prst="rect">
+            <a:avLst/>
+          </a:prstGeom>
+          <a:solidFill>
+            <a:schemeClr val="bg1"/>
+          </a:solidFill>
+          <a:ln w="9525">
+            <a:solidFill>
+              <a:schemeClr val="tx1">
+                <a:lumMod val="95000"/>
+                <a:lumOff val="5000"/>
+              </a:schemeClr>
+            </a:solidFill>
+          </a:ln>
+        </p:spPr>
+        <p:style>
+          <a:lnRef idx="2">
+            <a:schemeClr val="accent1">
+              <a:shade val="50000"/>
+            </a:schemeClr>
+          </a:lnRef>
+          <a:fillRef idx="1">
+            <a:schemeClr val="accent1"/>
+          </a:fillRef>
+          <a:effectRef idx="0">
+            <a:schemeClr val="accent1"/>
+          </a:effectRef>
+          <a:fontRef idx="minor">
+            <a:schemeClr val="lt1"/>
+          </a:fontRef>
+        </p:style>
+        <p:txBody>
+          <a:bodyPr rtlCol="0" anchor="ctr"/>
+          <a:lstStyle/>
+          <a:p>
+            <a:pPr algn="r"/>
+            <a:r>
+              <a:rPr lang="fr-CH" sz="1200" dirty="0" smtClean="0">
+                <a:solidFill>
+                  <a:schemeClr val="tx1"/>
+                </a:solidFill>
+              </a:rPr>
+              <a:t>DO</a:t>
+            </a:r>
+            <a:endParaRPr lang="en-US" sz="1200" dirty="0">
+              <a:solidFill>
+                <a:schemeClr val="tx1"/>
+              </a:solidFill>
+            </a:endParaRPr>
+          </a:p>
+        </p:txBody>
+      </p:sp>
+      <p:sp>
+        <p:nvSpPr>
+          <p:cNvPr id="45" name="Rectangle 44"/>
+          <p:cNvSpPr/>
+          <p:nvPr/>
+        </p:nvSpPr>
+        <p:spPr>
+          <a:xfrm>
+            <a:off x="182356" y="1515865"/>
+            <a:ext cx="1800000" cy="324000"/>
+          </a:xfrm>
+          <a:prstGeom prst="rect">
+            <a:avLst/>
+          </a:prstGeom>
+          <a:solidFill>
+            <a:schemeClr val="bg1"/>
+          </a:solidFill>
+          <a:ln w="9525">
+            <a:solidFill>
+              <a:schemeClr val="tx1">
+                <a:lumMod val="95000"/>
+                <a:lumOff val="5000"/>
+              </a:schemeClr>
+            </a:solidFill>
+          </a:ln>
+        </p:spPr>
+        <p:style>
+          <a:lnRef idx="2">
+            <a:schemeClr val="accent1">
+              <a:shade val="50000"/>
+            </a:schemeClr>
+          </a:lnRef>
+          <a:fillRef idx="1">
+            <a:schemeClr val="accent1"/>
+          </a:fillRef>
+          <a:effectRef idx="0">
+            <a:schemeClr val="accent1"/>
+          </a:effectRef>
+          <a:fontRef idx="minor">
+            <a:schemeClr val="lt1"/>
+          </a:fontRef>
+        </p:style>
+        <p:txBody>
+          <a:bodyPr rtlCol="0" anchor="ctr"/>
+          <a:lstStyle/>
+          <a:p>
+            <a:pPr algn="r"/>
+            <a:r>
+              <a:rPr lang="fr-CH" sz="1200" dirty="0" smtClean="0">
+                <a:solidFill>
+                  <a:schemeClr val="tx1"/>
+                </a:solidFill>
+              </a:rPr>
+              <a:t>LA</a:t>
+            </a:r>
+            <a:endParaRPr lang="en-US" sz="1200" dirty="0">
+              <a:solidFill>
+                <a:schemeClr val="tx1"/>
+              </a:solidFill>
+            </a:endParaRPr>
+          </a:p>
+        </p:txBody>
+      </p:sp>
+      <p:sp>
+        <p:nvSpPr>
+          <p:cNvPr id="46" name="Rectangle 45"/>
+          <p:cNvSpPr/>
+          <p:nvPr/>
+        </p:nvSpPr>
+        <p:spPr>
+          <a:xfrm>
+            <a:off x="182356" y="1836963"/>
+            <a:ext cx="1800000" cy="324000"/>
+          </a:xfrm>
+          <a:prstGeom prst="rect">
+            <a:avLst/>
+          </a:prstGeom>
+          <a:solidFill>
+            <a:schemeClr val="bg1"/>
+          </a:solidFill>
+          <a:ln w="9525">
+            <a:solidFill>
+              <a:schemeClr val="tx1">
+                <a:lumMod val="95000"/>
+                <a:lumOff val="5000"/>
+              </a:schemeClr>
+            </a:solidFill>
+          </a:ln>
+        </p:spPr>
+        <p:style>
+          <a:lnRef idx="2">
+            <a:schemeClr val="accent1">
+              <a:shade val="50000"/>
+            </a:schemeClr>
+          </a:lnRef>
+          <a:fillRef idx="1">
+            <a:schemeClr val="accent1"/>
+          </a:fillRef>
+          <a:effectRef idx="0">
+            <a:schemeClr val="accent1"/>
+          </a:effectRef>
+          <a:fontRef idx="minor">
+            <a:schemeClr val="lt1"/>
+          </a:fontRef>
+        </p:style>
+        <p:txBody>
+          <a:bodyPr rtlCol="0" anchor="ctr"/>
+          <a:lstStyle/>
+          <a:p>
+            <a:pPr algn="r"/>
+            <a:r>
+              <a:rPr lang="fr-CH" sz="1200" dirty="0" smtClean="0">
+                <a:solidFill>
+                  <a:schemeClr val="tx1"/>
+                </a:solidFill>
+              </a:rPr>
+              <a:t>SOL</a:t>
+            </a:r>
+            <a:endParaRPr lang="en-US" sz="1200" dirty="0">
+              <a:solidFill>
+                <a:schemeClr val="tx1"/>
+              </a:solidFill>
+            </a:endParaRPr>
+          </a:p>
+        </p:txBody>
+      </p:sp>
+      <p:sp>
+        <p:nvSpPr>
+          <p:cNvPr id="47" name="Rectangle 46"/>
+          <p:cNvSpPr/>
+          <p:nvPr/>
+        </p:nvSpPr>
+        <p:spPr>
+          <a:xfrm>
+            <a:off x="182356" y="2152696"/>
+            <a:ext cx="1800000" cy="324000"/>
+          </a:xfrm>
+          <a:prstGeom prst="rect">
+            <a:avLst/>
+          </a:prstGeom>
+          <a:solidFill>
+            <a:schemeClr val="bg1"/>
+          </a:solidFill>
+          <a:ln w="9525">
+            <a:solidFill>
+              <a:schemeClr val="tx1">
+                <a:lumMod val="95000"/>
+                <a:lumOff val="5000"/>
+              </a:schemeClr>
+            </a:solidFill>
+          </a:ln>
+        </p:spPr>
+        <p:style>
+          <a:lnRef idx="2">
+            <a:schemeClr val="accent1">
+              <a:shade val="50000"/>
+            </a:schemeClr>
+          </a:lnRef>
+          <a:fillRef idx="1">
+            <a:schemeClr val="accent1"/>
+          </a:fillRef>
+          <a:effectRef idx="0">
+            <a:schemeClr val="accent1"/>
+          </a:effectRef>
+          <a:fontRef idx="minor">
+            <a:schemeClr val="lt1"/>
+          </a:fontRef>
+        </p:style>
+        <p:txBody>
+          <a:bodyPr rtlCol="0" anchor="ctr"/>
+          <a:lstStyle/>
+          <a:p>
+            <a:pPr algn="r"/>
+            <a:r>
+              <a:rPr lang="fr-CH" sz="1200" dirty="0" smtClean="0">
+                <a:solidFill>
+                  <a:schemeClr val="tx1"/>
+                </a:solidFill>
+              </a:rPr>
+              <a:t>FA</a:t>
+            </a:r>
+            <a:endParaRPr lang="en-US" sz="1200" dirty="0">
+              <a:solidFill>
+                <a:schemeClr val="tx1"/>
+              </a:solidFill>
+            </a:endParaRPr>
+          </a:p>
+        </p:txBody>
+      </p:sp>
+      <p:sp>
+        <p:nvSpPr>
+          <p:cNvPr id="48" name="Rectangle 47"/>
+          <p:cNvSpPr/>
+          <p:nvPr/>
+        </p:nvSpPr>
+        <p:spPr>
+          <a:xfrm>
+            <a:off x="182356" y="1186950"/>
+            <a:ext cx="1800000" cy="324000"/>
+          </a:xfrm>
+          <a:prstGeom prst="rect">
+            <a:avLst/>
+          </a:prstGeom>
+          <a:solidFill>
+            <a:schemeClr val="bg1"/>
+          </a:solidFill>
+          <a:ln w="9525">
+            <a:solidFill>
+              <a:schemeClr val="tx1">
+                <a:lumMod val="95000"/>
+                <a:lumOff val="5000"/>
+              </a:schemeClr>
+            </a:solidFill>
+          </a:ln>
+        </p:spPr>
+        <p:style>
+          <a:lnRef idx="2">
+            <a:schemeClr val="accent1">
+              <a:shade val="50000"/>
+            </a:schemeClr>
+          </a:lnRef>
+          <a:fillRef idx="1">
+            <a:schemeClr val="accent1"/>
+          </a:fillRef>
+          <a:effectRef idx="0">
+            <a:schemeClr val="accent1"/>
+          </a:effectRef>
+          <a:fontRef idx="minor">
+            <a:schemeClr val="lt1"/>
+          </a:fontRef>
+        </p:style>
+        <p:txBody>
+          <a:bodyPr rtlCol="0" anchor="ctr"/>
+          <a:lstStyle/>
+          <a:p>
+            <a:pPr algn="r"/>
+            <a:r>
+              <a:rPr lang="fr-CH" sz="1200" dirty="0" smtClean="0">
+                <a:solidFill>
+                  <a:schemeClr val="tx1"/>
+                </a:solidFill>
+              </a:rPr>
+              <a:t>SI</a:t>
+            </a:r>
+            <a:endParaRPr lang="en-US" sz="1200" dirty="0">
+              <a:solidFill>
+                <a:schemeClr val="tx1"/>
+              </a:solidFill>
+            </a:endParaRPr>
+          </a:p>
+        </p:txBody>
+      </p:sp>
+      <p:sp>
+        <p:nvSpPr>
+          <p:cNvPr id="56" name="Rectangle 55"/>
+          <p:cNvSpPr/>
+          <p:nvPr/>
+        </p:nvSpPr>
+        <p:spPr>
+          <a:xfrm>
+            <a:off x="193557" y="3041871"/>
+            <a:ext cx="1008000" cy="180000"/>
+          </a:xfrm>
+          <a:prstGeom prst="rect">
+            <a:avLst/>
+          </a:prstGeom>
+          <a:solidFill>
+            <a:schemeClr val="tx1">
+              <a:lumMod val="95000"/>
+              <a:lumOff val="5000"/>
+            </a:schemeClr>
+          </a:solidFill>
+          <a:ln>
+            <a:noFill/>
+          </a:ln>
+        </p:spPr>
+        <p:style>
+          <a:lnRef idx="2">
+            <a:schemeClr val="accent1">
+              <a:shade val="50000"/>
+            </a:schemeClr>
+          </a:lnRef>
+          <a:fillRef idx="1">
+            <a:schemeClr val="accent1"/>
+          </a:fillRef>
+          <a:effectRef idx="0">
+            <a:schemeClr val="accent1"/>
+          </a:effectRef>
+          <a:fontRef idx="minor">
+            <a:schemeClr val="lt1"/>
+          </a:fontRef>
+        </p:style>
+        <p:txBody>
+          <a:bodyPr rtlCol="0" anchor="ctr"/>
+          <a:lstStyle/>
+          <a:p>
+            <a:pPr algn="ctr"/>
+            <a:r>
+              <a:rPr lang="fr-CH" sz="1200" dirty="0" smtClean="0"/>
+              <a:t>DO#</a:t>
+            </a:r>
+            <a:endParaRPr lang="en-US" sz="1200" dirty="0"/>
+          </a:p>
+        </p:txBody>
+      </p:sp>
+      <p:sp>
+        <p:nvSpPr>
+          <p:cNvPr id="57" name="Rectangle 56"/>
+          <p:cNvSpPr/>
+          <p:nvPr/>
+        </p:nvSpPr>
+        <p:spPr>
+          <a:xfrm>
+            <a:off x="193557" y="2711771"/>
+            <a:ext cx="1008000" cy="180000"/>
+          </a:xfrm>
+          <a:prstGeom prst="rect">
+            <a:avLst/>
+          </a:prstGeom>
+          <a:solidFill>
+            <a:schemeClr val="tx1">
+              <a:lumMod val="95000"/>
+              <a:lumOff val="5000"/>
+            </a:schemeClr>
+          </a:solidFill>
+          <a:ln>
+            <a:noFill/>
+          </a:ln>
+        </p:spPr>
+        <p:style>
+          <a:lnRef idx="2">
+            <a:schemeClr val="accent1">
+              <a:shade val="50000"/>
+            </a:schemeClr>
+          </a:lnRef>
+          <a:fillRef idx="1">
+            <a:schemeClr val="accent1"/>
+          </a:fillRef>
+          <a:effectRef idx="0">
+            <a:schemeClr val="accent1"/>
+          </a:effectRef>
+          <a:fontRef idx="minor">
+            <a:schemeClr val="lt1"/>
+          </a:fontRef>
+        </p:style>
+        <p:txBody>
+          <a:bodyPr rtlCol="0" anchor="ctr"/>
+          <a:lstStyle/>
+          <a:p>
+            <a:pPr algn="ctr"/>
+            <a:r>
+              <a:rPr lang="fr-CH" sz="1200" dirty="0" smtClean="0"/>
+              <a:t>RE</a:t>
+            </a:r>
+            <a:r>
+              <a:rPr lang="fr-CH" sz="1200" dirty="0"/>
+              <a:t> #</a:t>
+            </a:r>
+            <a:endParaRPr lang="en-US" sz="1200" dirty="0"/>
+          </a:p>
+        </p:txBody>
+      </p:sp>
+      <p:sp>
+        <p:nvSpPr>
+          <p:cNvPr id="58" name="Rectangle 57"/>
+          <p:cNvSpPr/>
+          <p:nvPr/>
+        </p:nvSpPr>
+        <p:spPr>
+          <a:xfrm>
+            <a:off x="193557" y="2060941"/>
+            <a:ext cx="1008000" cy="180000"/>
+          </a:xfrm>
+          <a:prstGeom prst="rect">
+            <a:avLst/>
+          </a:prstGeom>
+          <a:solidFill>
+            <a:schemeClr val="tx1">
+              <a:lumMod val="95000"/>
+              <a:lumOff val="5000"/>
+            </a:schemeClr>
+          </a:solidFill>
+          <a:ln>
+            <a:noFill/>
+          </a:ln>
+        </p:spPr>
+        <p:style>
+          <a:lnRef idx="2">
+            <a:schemeClr val="accent1">
+              <a:shade val="50000"/>
+            </a:schemeClr>
+          </a:lnRef>
+          <a:fillRef idx="1">
+            <a:schemeClr val="accent1"/>
+          </a:fillRef>
+          <a:effectRef idx="0">
+            <a:schemeClr val="accent1"/>
+          </a:effectRef>
+          <a:fontRef idx="minor">
+            <a:schemeClr val="lt1"/>
+          </a:fontRef>
+        </p:style>
+        <p:txBody>
+          <a:bodyPr rtlCol="0" anchor="ctr"/>
+          <a:lstStyle/>
+          <a:p>
+            <a:pPr algn="ctr"/>
+            <a:r>
+              <a:rPr lang="fr-CH" sz="1200" dirty="0" smtClean="0"/>
+              <a:t>FA</a:t>
+            </a:r>
+            <a:r>
+              <a:rPr lang="fr-CH" sz="1200" dirty="0"/>
+              <a:t> #</a:t>
+            </a:r>
+            <a:endParaRPr lang="en-US" sz="1200" dirty="0"/>
+          </a:p>
+        </p:txBody>
+      </p:sp>
+      <p:sp>
+        <p:nvSpPr>
+          <p:cNvPr id="59" name="Rectangle 58"/>
+          <p:cNvSpPr/>
+          <p:nvPr/>
+        </p:nvSpPr>
+        <p:spPr>
+          <a:xfrm>
+            <a:off x="193557" y="1736643"/>
+            <a:ext cx="1008000" cy="180000"/>
+          </a:xfrm>
+          <a:prstGeom prst="rect">
+            <a:avLst/>
+          </a:prstGeom>
+          <a:solidFill>
+            <a:schemeClr val="tx1">
+              <a:lumMod val="95000"/>
+              <a:lumOff val="5000"/>
+            </a:schemeClr>
+          </a:solidFill>
+          <a:ln>
+            <a:noFill/>
+          </a:ln>
+        </p:spPr>
+        <p:style>
+          <a:lnRef idx="2">
+            <a:schemeClr val="accent1">
+              <a:shade val="50000"/>
+            </a:schemeClr>
+          </a:lnRef>
+          <a:fillRef idx="1">
+            <a:schemeClr val="accent1"/>
+          </a:fillRef>
+          <a:effectRef idx="0">
+            <a:schemeClr val="accent1"/>
+          </a:effectRef>
+          <a:fontRef idx="minor">
+            <a:schemeClr val="lt1"/>
+          </a:fontRef>
+        </p:style>
+        <p:txBody>
+          <a:bodyPr rtlCol="0" anchor="ctr"/>
+          <a:lstStyle/>
+          <a:p>
+            <a:pPr algn="ctr"/>
+            <a:r>
+              <a:rPr lang="fr-CH" sz="1200" dirty="0" smtClean="0"/>
+              <a:t>SOL</a:t>
+            </a:r>
+            <a:r>
+              <a:rPr lang="fr-CH" sz="1200" dirty="0"/>
+              <a:t> #</a:t>
+            </a:r>
+            <a:endParaRPr lang="en-US" sz="1200" dirty="0"/>
+          </a:p>
+        </p:txBody>
+      </p:sp>
+      <p:sp>
+        <p:nvSpPr>
+          <p:cNvPr id="60" name="Rectangle 59"/>
+          <p:cNvSpPr/>
+          <p:nvPr/>
+        </p:nvSpPr>
+        <p:spPr>
+          <a:xfrm>
+            <a:off x="193557" y="1416956"/>
+            <a:ext cx="1008000" cy="180000"/>
+          </a:xfrm>
+          <a:prstGeom prst="rect">
+            <a:avLst/>
+          </a:prstGeom>
+          <a:solidFill>
+            <a:schemeClr val="tx1">
+              <a:lumMod val="95000"/>
+              <a:lumOff val="5000"/>
+            </a:schemeClr>
+          </a:solidFill>
+          <a:ln>
+            <a:noFill/>
+          </a:ln>
+        </p:spPr>
+        <p:style>
+          <a:lnRef idx="2">
+            <a:schemeClr val="accent1">
+              <a:shade val="50000"/>
+            </a:schemeClr>
+          </a:lnRef>
+          <a:fillRef idx="1">
+            <a:schemeClr val="accent1"/>
+          </a:fillRef>
+          <a:effectRef idx="0">
+            <a:schemeClr val="accent1"/>
+          </a:effectRef>
+          <a:fontRef idx="minor">
+            <a:schemeClr val="lt1"/>
+          </a:fontRef>
+        </p:style>
+        <p:txBody>
+          <a:bodyPr rtlCol="0" anchor="ctr"/>
+          <a:lstStyle/>
+          <a:p>
+            <a:pPr algn="ctr"/>
+            <a:r>
+              <a:rPr lang="fr-CH" sz="1200" dirty="0" smtClean="0"/>
+              <a:t>LA</a:t>
+            </a:r>
+            <a:r>
+              <a:rPr lang="fr-CH" sz="1200" dirty="0"/>
+              <a:t> #</a:t>
+            </a:r>
+            <a:endParaRPr lang="en-US" sz="1200" dirty="0"/>
+          </a:p>
+        </p:txBody>
+      </p:sp>
+    </p:spTree>
+    <p:extLst>
+      <p:ext uri="{BB962C8B-B14F-4D97-AF65-F5344CB8AC3E}">
+        <p14:creationId xmlns:p14="http://schemas.microsoft.com/office/powerpoint/2010/main" val="3235807744"/>
+      </p:ext>
+    </p:extLst>
+  </p:cSld>
+  <p:clrMapOvr>
+    <a:masterClrMapping/>
+  </p:clrMapOvr>
 </p:sld>
 </file>
 

</xml_diff>

<commit_message>
modification planning, visualisation playlist
</commit_message>
<xml_diff>
--- a/Administratif/Visuel/Visuel.pptx
+++ b/Administratif/Visuel/Visuel.pptx
@@ -203,7 +203,7 @@
           <a:p>
             <a:fld id="{1226F8A9-A3C3-454C-80DE-58F97EE8E331}" type="datetimeFigureOut">
               <a:rPr lang="fr-CH" smtClean="0"/>
-              <a:t>28.06.2016</a:t>
+              <a:t>30.06.2016</a:t>
             </a:fld>
             <a:endParaRPr lang="fr-CH"/>
           </a:p>
@@ -686,7 +686,7 @@
           <a:p>
             <a:fld id="{A5DE0357-5E3B-455B-85D6-97D04540FA5A}" type="datetimeFigureOut">
               <a:rPr lang="en-US" smtClean="0"/>
-              <a:t>6/28/2016</a:t>
+              <a:t>6/30/2016</a:t>
             </a:fld>
             <a:endParaRPr lang="en-US"/>
           </a:p>
@@ -856,7 +856,7 @@
           <a:p>
             <a:fld id="{A5DE0357-5E3B-455B-85D6-97D04540FA5A}" type="datetimeFigureOut">
               <a:rPr lang="en-US" smtClean="0"/>
-              <a:t>6/28/2016</a:t>
+              <a:t>6/30/2016</a:t>
             </a:fld>
             <a:endParaRPr lang="en-US"/>
           </a:p>
@@ -1036,7 +1036,7 @@
           <a:p>
             <a:fld id="{A5DE0357-5E3B-455B-85D6-97D04540FA5A}" type="datetimeFigureOut">
               <a:rPr lang="en-US" smtClean="0"/>
-              <a:t>6/28/2016</a:t>
+              <a:t>6/30/2016</a:t>
             </a:fld>
             <a:endParaRPr lang="en-US"/>
           </a:p>
@@ -1206,7 +1206,7 @@
           <a:p>
             <a:fld id="{A5DE0357-5E3B-455B-85D6-97D04540FA5A}" type="datetimeFigureOut">
               <a:rPr lang="en-US" smtClean="0"/>
-              <a:t>6/28/2016</a:t>
+              <a:t>6/30/2016</a:t>
             </a:fld>
             <a:endParaRPr lang="en-US"/>
           </a:p>
@@ -1452,7 +1452,7 @@
           <a:p>
             <a:fld id="{A5DE0357-5E3B-455B-85D6-97D04540FA5A}" type="datetimeFigureOut">
               <a:rPr lang="en-US" smtClean="0"/>
-              <a:t>6/28/2016</a:t>
+              <a:t>6/30/2016</a:t>
             </a:fld>
             <a:endParaRPr lang="en-US"/>
           </a:p>
@@ -1684,7 +1684,7 @@
           <a:p>
             <a:fld id="{A5DE0357-5E3B-455B-85D6-97D04540FA5A}" type="datetimeFigureOut">
               <a:rPr lang="en-US" smtClean="0"/>
-              <a:t>6/28/2016</a:t>
+              <a:t>6/30/2016</a:t>
             </a:fld>
             <a:endParaRPr lang="en-US"/>
           </a:p>
@@ -2051,7 +2051,7 @@
           <a:p>
             <a:fld id="{A5DE0357-5E3B-455B-85D6-97D04540FA5A}" type="datetimeFigureOut">
               <a:rPr lang="en-US" smtClean="0"/>
-              <a:t>6/28/2016</a:t>
+              <a:t>6/30/2016</a:t>
             </a:fld>
             <a:endParaRPr lang="en-US"/>
           </a:p>
@@ -2169,7 +2169,7 @@
           <a:p>
             <a:fld id="{A5DE0357-5E3B-455B-85D6-97D04540FA5A}" type="datetimeFigureOut">
               <a:rPr lang="en-US" smtClean="0"/>
-              <a:t>6/28/2016</a:t>
+              <a:t>6/30/2016</a:t>
             </a:fld>
             <a:endParaRPr lang="en-US"/>
           </a:p>
@@ -2264,7 +2264,7 @@
           <a:p>
             <a:fld id="{A5DE0357-5E3B-455B-85D6-97D04540FA5A}" type="datetimeFigureOut">
               <a:rPr lang="en-US" smtClean="0"/>
-              <a:t>6/28/2016</a:t>
+              <a:t>6/30/2016</a:t>
             </a:fld>
             <a:endParaRPr lang="en-US"/>
           </a:p>
@@ -2541,7 +2541,7 @@
           <a:p>
             <a:fld id="{A5DE0357-5E3B-455B-85D6-97D04540FA5A}" type="datetimeFigureOut">
               <a:rPr lang="en-US" smtClean="0"/>
-              <a:t>6/28/2016</a:t>
+              <a:t>6/30/2016</a:t>
             </a:fld>
             <a:endParaRPr lang="en-US"/>
           </a:p>
@@ -2794,7 +2794,7 @@
           <a:p>
             <a:fld id="{A5DE0357-5E3B-455B-85D6-97D04540FA5A}" type="datetimeFigureOut">
               <a:rPr lang="en-US" smtClean="0"/>
-              <a:t>6/28/2016</a:t>
+              <a:t>6/30/2016</a:t>
             </a:fld>
             <a:endParaRPr lang="en-US"/>
           </a:p>
@@ -3007,7 +3007,7 @@
           <a:p>
             <a:fld id="{A5DE0357-5E3B-455B-85D6-97D04540FA5A}" type="datetimeFigureOut">
               <a:rPr lang="en-US" smtClean="0"/>
-              <a:t>6/28/2016</a:t>
+              <a:t>6/30/2016</a:t>
             </a:fld>
             <a:endParaRPr lang="en-US"/>
           </a:p>
@@ -5900,6 +5900,47 @@
           </a:p>
         </p:txBody>
       </p:sp>
+      <p:pic>
+        <p:nvPicPr>
+          <p:cNvPr id="40" name="Picture 2" descr="https://www.y-parc.ch/uploads/pics/20151121_image_event_po-heig-vd.png"/>
+          <p:cNvPicPr>
+            <a:picLocks noChangeAspect="1" noChangeArrowheads="1"/>
+          </p:cNvPicPr>
+          <p:nvPr/>
+        </p:nvPicPr>
+        <p:blipFill>
+          <a:blip r:embed="rId16" cstate="print">
+            <a:extLst>
+              <a:ext uri="{28A0092B-C50C-407E-A947-70E740481C1C}">
+                <a14:useLocalDpi xmlns:a14="http://schemas.microsoft.com/office/drawing/2010/main" val="0"/>
+              </a:ext>
+            </a:extLst>
+          </a:blip>
+          <a:srcRect/>
+          <a:stretch>
+            <a:fillRect/>
+          </a:stretch>
+        </p:blipFill>
+        <p:spPr bwMode="auto">
+          <a:xfrm>
+            <a:off x="6848491" y="895438"/>
+            <a:ext cx="1413960" cy="585087"/>
+          </a:xfrm>
+          <a:prstGeom prst="rect">
+            <a:avLst/>
+          </a:prstGeom>
+          <a:noFill/>
+          <a:extLst>
+            <a:ext uri="{909E8E84-426E-40DD-AFC4-6F175D3DCCD1}">
+              <a14:hiddenFill xmlns:a14="http://schemas.microsoft.com/office/drawing/2010/main">
+                <a:solidFill>
+                  <a:srgbClr val="FFFFFF"/>
+                </a:solidFill>
+              </a14:hiddenFill>
+            </a:ext>
+          </a:extLst>
+        </p:spPr>
+      </p:pic>
     </p:spTree>
     <p:extLst>
       <p:ext uri="{BB962C8B-B14F-4D97-AF65-F5344CB8AC3E}">
@@ -14303,7 +14344,7 @@
             <a:avLst/>
           </a:prstGeom>
           <a:solidFill>
-            <a:srgbClr val="00A1DA"/>
+            <a:srgbClr val="EF8201"/>
           </a:solidFill>
           <a:ln>
             <a:noFill/>
@@ -14526,16 +14567,65 @@
           </a:p>
         </p:txBody>
       </p:sp>
+      <p:sp>
+        <p:nvSpPr>
+          <p:cNvPr id="67" name="Rectangle 66"/>
+          <p:cNvSpPr/>
+          <p:nvPr/>
+        </p:nvSpPr>
+        <p:spPr>
+          <a:xfrm>
+            <a:off x="7434451" y="236629"/>
+            <a:ext cx="828000" cy="486353"/>
+          </a:xfrm>
+          <a:prstGeom prst="rect">
+            <a:avLst/>
+          </a:prstGeom>
+          <a:solidFill>
+            <a:srgbClr val="002060"/>
+          </a:solidFill>
+          <a:ln>
+            <a:noFill/>
+          </a:ln>
+        </p:spPr>
+        <p:style>
+          <a:lnRef idx="2">
+            <a:schemeClr val="accent1">
+              <a:shade val="50000"/>
+            </a:schemeClr>
+          </a:lnRef>
+          <a:fillRef idx="1">
+            <a:schemeClr val="accent1"/>
+          </a:fillRef>
+          <a:effectRef idx="0">
+            <a:schemeClr val="accent1"/>
+          </a:effectRef>
+          <a:fontRef idx="minor">
+            <a:schemeClr val="lt1"/>
+          </a:fontRef>
+        </p:style>
+        <p:txBody>
+          <a:bodyPr rtlCol="0" anchor="b"/>
+          <a:lstStyle/>
+          <a:p>
+            <a:pPr algn="r"/>
+            <a:endParaRPr lang="en-US" dirty="0">
+              <a:latin typeface="Segoe UI Light" panose="020B0502040204020203" pitchFamily="34" charset="0"/>
+              <a:cs typeface="Segoe UI Light" panose="020B0502040204020203" pitchFamily="34" charset="0"/>
+            </a:endParaRPr>
+          </a:p>
+        </p:txBody>
+      </p:sp>
       <p:pic>
         <p:nvPicPr>
-          <p:cNvPr id="49" name="Image 48"/>
+          <p:cNvPr id="68" name="Image 67"/>
           <p:cNvPicPr>
             <a:picLocks noChangeAspect="1"/>
           </p:cNvPicPr>
           <p:nvPr/>
         </p:nvPicPr>
         <p:blipFill>
-          <a:blip r:embed="rId4" cstate="print">
+          <a:blip r:embed="rId4">
             <a:extLst>
               <a:ext uri="{28A0092B-C50C-407E-A947-70E740481C1C}">
                 <a14:useLocalDpi xmlns:a14="http://schemas.microsoft.com/office/drawing/2010/main" val="0"/>
@@ -14548,90 +14638,30 @@
         </p:blipFill>
         <p:spPr>
           <a:xfrm>
-            <a:off x="7340708" y="5751464"/>
-            <a:ext cx="242436" cy="242436"/>
+            <a:off x="7641070" y="294024"/>
+            <a:ext cx="391925" cy="391925"/>
           </a:xfrm>
           <a:prstGeom prst="rect">
             <a:avLst/>
           </a:prstGeom>
         </p:spPr>
       </p:pic>
-      <p:pic>
-        <p:nvPicPr>
-          <p:cNvPr id="50" name="Image 49"/>
-          <p:cNvPicPr>
-            <a:picLocks noChangeAspect="1"/>
-          </p:cNvPicPr>
-          <p:nvPr/>
-        </p:nvPicPr>
-        <p:blipFill>
-          <a:blip r:embed="rId4" cstate="print">
-            <a:extLst>
-              <a:ext uri="{28A0092B-C50C-407E-A947-70E740481C1C}">
-                <a14:useLocalDpi xmlns:a14="http://schemas.microsoft.com/office/drawing/2010/main" val="0"/>
-              </a:ext>
-            </a:extLst>
-          </a:blip>
-          <a:stretch>
-            <a:fillRect/>
-          </a:stretch>
-        </p:blipFill>
-        <p:spPr>
-          <a:xfrm>
-            <a:off x="4137713" y="5759204"/>
-            <a:ext cx="240131" cy="240131"/>
-          </a:xfrm>
-          <a:prstGeom prst="rect">
-            <a:avLst/>
-          </a:prstGeom>
-        </p:spPr>
-      </p:pic>
-      <p:pic>
-        <p:nvPicPr>
-          <p:cNvPr id="51" name="Image 50"/>
-          <p:cNvPicPr>
-            <a:picLocks noChangeAspect="1"/>
-          </p:cNvPicPr>
-          <p:nvPr/>
-        </p:nvPicPr>
-        <p:blipFill>
-          <a:blip r:embed="rId4" cstate="print">
-            <a:extLst>
-              <a:ext uri="{28A0092B-C50C-407E-A947-70E740481C1C}">
-                <a14:useLocalDpi xmlns:a14="http://schemas.microsoft.com/office/drawing/2010/main" val="0"/>
-              </a:ext>
-            </a:extLst>
-          </a:blip>
-          <a:stretch>
-            <a:fillRect/>
-          </a:stretch>
-        </p:blipFill>
-        <p:spPr>
-          <a:xfrm>
-            <a:off x="5721161" y="5758952"/>
-            <a:ext cx="242436" cy="242436"/>
-          </a:xfrm>
-          <a:prstGeom prst="rect">
-            <a:avLst/>
-          </a:prstGeom>
-        </p:spPr>
-      </p:pic>
-      <p:sp>
-        <p:nvSpPr>
-          <p:cNvPr id="67" name="Rectangle 66"/>
-          <p:cNvSpPr/>
-          <p:nvPr/>
-        </p:nvSpPr>
-        <p:spPr>
-          <a:xfrm>
-            <a:off x="7434451" y="236629"/>
+      <p:sp>
+        <p:nvSpPr>
+          <p:cNvPr id="69" name="Rectangle 68"/>
+          <p:cNvSpPr/>
+          <p:nvPr/>
+        </p:nvSpPr>
+        <p:spPr>
+          <a:xfrm>
+            <a:off x="6482399" y="236629"/>
             <a:ext cx="828000" cy="486353"/>
           </a:xfrm>
           <a:prstGeom prst="rect">
             <a:avLst/>
           </a:prstGeom>
           <a:solidFill>
-            <a:srgbClr val="002060"/>
+            <a:srgbClr val="00A1DA"/>
           </a:solidFill>
           <a:ln>
             <a:noFill/>
@@ -14665,9 +14695,107 @@
           </a:p>
         </p:txBody>
       </p:sp>
+      <p:sp>
+        <p:nvSpPr>
+          <p:cNvPr id="70" name="Rectangle 69"/>
+          <p:cNvSpPr/>
+          <p:nvPr/>
+        </p:nvSpPr>
+        <p:spPr>
+          <a:xfrm>
+            <a:off x="4578295" y="236629"/>
+            <a:ext cx="828000" cy="486353"/>
+          </a:xfrm>
+          <a:prstGeom prst="rect">
+            <a:avLst/>
+          </a:prstGeom>
+          <a:solidFill>
+            <a:srgbClr val="002060"/>
+          </a:solidFill>
+          <a:ln>
+            <a:noFill/>
+          </a:ln>
+        </p:spPr>
+        <p:style>
+          <a:lnRef idx="2">
+            <a:schemeClr val="accent1">
+              <a:shade val="50000"/>
+            </a:schemeClr>
+          </a:lnRef>
+          <a:fillRef idx="1">
+            <a:schemeClr val="accent1"/>
+          </a:fillRef>
+          <a:effectRef idx="0">
+            <a:schemeClr val="accent1"/>
+          </a:effectRef>
+          <a:fontRef idx="minor">
+            <a:schemeClr val="lt1"/>
+          </a:fontRef>
+        </p:style>
+        <p:txBody>
+          <a:bodyPr rtlCol="0" anchor="b"/>
+          <a:lstStyle/>
+          <a:p>
+            <a:pPr algn="r"/>
+            <a:endParaRPr lang="en-US" dirty="0">
+              <a:latin typeface="Segoe UI Light" panose="020B0502040204020203" pitchFamily="34" charset="0"/>
+              <a:cs typeface="Segoe UI Light" panose="020B0502040204020203" pitchFamily="34" charset="0"/>
+            </a:endParaRPr>
+          </a:p>
+        </p:txBody>
+      </p:sp>
+      <p:sp>
+        <p:nvSpPr>
+          <p:cNvPr id="71" name="Rectangle 70"/>
+          <p:cNvSpPr/>
+          <p:nvPr/>
+        </p:nvSpPr>
+        <p:spPr>
+          <a:xfrm>
+            <a:off x="5530347" y="236629"/>
+            <a:ext cx="828000" cy="486353"/>
+          </a:xfrm>
+          <a:prstGeom prst="rect">
+            <a:avLst/>
+          </a:prstGeom>
+          <a:solidFill>
+            <a:srgbClr val="002060"/>
+          </a:solidFill>
+          <a:ln>
+            <a:noFill/>
+          </a:ln>
+        </p:spPr>
+        <p:style>
+          <a:lnRef idx="2">
+            <a:schemeClr val="accent1">
+              <a:shade val="50000"/>
+            </a:schemeClr>
+          </a:lnRef>
+          <a:fillRef idx="1">
+            <a:schemeClr val="accent1"/>
+          </a:fillRef>
+          <a:effectRef idx="0">
+            <a:schemeClr val="accent1"/>
+          </a:effectRef>
+          <a:fontRef idx="minor">
+            <a:schemeClr val="lt1"/>
+          </a:fontRef>
+        </p:style>
+        <p:txBody>
+          <a:bodyPr rtlCol="0" anchor="b"/>
+          <a:lstStyle/>
+          <a:p>
+            <a:pPr algn="r"/>
+            <a:endParaRPr lang="en-US" dirty="0">
+              <a:latin typeface="Segoe UI Light" panose="020B0502040204020203" pitchFamily="34" charset="0"/>
+              <a:cs typeface="Segoe UI Light" panose="020B0502040204020203" pitchFamily="34" charset="0"/>
+            </a:endParaRPr>
+          </a:p>
+        </p:txBody>
+      </p:sp>
       <p:pic>
         <p:nvPicPr>
-          <p:cNvPr id="68" name="Image 67"/>
+          <p:cNvPr id="80" name="Image 79"/>
           <p:cNvPicPr>
             <a:picLocks noChangeAspect="1"/>
           </p:cNvPicPr>
@@ -14687,7 +14815,7 @@
         </p:blipFill>
         <p:spPr>
           <a:xfrm>
-            <a:off x="7641070" y="294024"/>
+            <a:off x="6700436" y="294024"/>
             <a:ext cx="391925" cy="391925"/>
           </a:xfrm>
           <a:prstGeom prst="rect">
@@ -14695,156 +14823,9 @@
           </a:prstGeom>
         </p:spPr>
       </p:pic>
-      <p:sp>
-        <p:nvSpPr>
-          <p:cNvPr id="69" name="Rectangle 68"/>
-          <p:cNvSpPr/>
-          <p:nvPr/>
-        </p:nvSpPr>
-        <p:spPr>
-          <a:xfrm>
-            <a:off x="6482399" y="236629"/>
-            <a:ext cx="828000" cy="486353"/>
-          </a:xfrm>
-          <a:prstGeom prst="rect">
-            <a:avLst/>
-          </a:prstGeom>
-          <a:solidFill>
-            <a:srgbClr val="00A1DA"/>
-          </a:solidFill>
-          <a:ln>
-            <a:noFill/>
-          </a:ln>
-        </p:spPr>
-        <p:style>
-          <a:lnRef idx="2">
-            <a:schemeClr val="accent1">
-              <a:shade val="50000"/>
-            </a:schemeClr>
-          </a:lnRef>
-          <a:fillRef idx="1">
-            <a:schemeClr val="accent1"/>
-          </a:fillRef>
-          <a:effectRef idx="0">
-            <a:schemeClr val="accent1"/>
-          </a:effectRef>
-          <a:fontRef idx="minor">
-            <a:schemeClr val="lt1"/>
-          </a:fontRef>
-        </p:style>
-        <p:txBody>
-          <a:bodyPr rtlCol="0" anchor="b"/>
-          <a:lstStyle/>
-          <a:p>
-            <a:pPr algn="r"/>
-            <a:endParaRPr lang="en-US" dirty="0">
-              <a:latin typeface="Segoe UI Light" panose="020B0502040204020203" pitchFamily="34" charset="0"/>
-              <a:cs typeface="Segoe UI Light" panose="020B0502040204020203" pitchFamily="34" charset="0"/>
-            </a:endParaRPr>
-          </a:p>
-        </p:txBody>
-      </p:sp>
-      <p:sp>
-        <p:nvSpPr>
-          <p:cNvPr id="70" name="Rectangle 69"/>
-          <p:cNvSpPr/>
-          <p:nvPr/>
-        </p:nvSpPr>
-        <p:spPr>
-          <a:xfrm>
-            <a:off x="4578295" y="236629"/>
-            <a:ext cx="828000" cy="486353"/>
-          </a:xfrm>
-          <a:prstGeom prst="rect">
-            <a:avLst/>
-          </a:prstGeom>
-          <a:solidFill>
-            <a:srgbClr val="002060"/>
-          </a:solidFill>
-          <a:ln>
-            <a:noFill/>
-          </a:ln>
-        </p:spPr>
-        <p:style>
-          <a:lnRef idx="2">
-            <a:schemeClr val="accent1">
-              <a:shade val="50000"/>
-            </a:schemeClr>
-          </a:lnRef>
-          <a:fillRef idx="1">
-            <a:schemeClr val="accent1"/>
-          </a:fillRef>
-          <a:effectRef idx="0">
-            <a:schemeClr val="accent1"/>
-          </a:effectRef>
-          <a:fontRef idx="minor">
-            <a:schemeClr val="lt1"/>
-          </a:fontRef>
-        </p:style>
-        <p:txBody>
-          <a:bodyPr rtlCol="0" anchor="b"/>
-          <a:lstStyle/>
-          <a:p>
-            <a:pPr algn="r"/>
-            <a:endParaRPr lang="en-US" dirty="0">
-              <a:latin typeface="Segoe UI Light" panose="020B0502040204020203" pitchFamily="34" charset="0"/>
-              <a:cs typeface="Segoe UI Light" panose="020B0502040204020203" pitchFamily="34" charset="0"/>
-            </a:endParaRPr>
-          </a:p>
-        </p:txBody>
-      </p:sp>
-      <p:sp>
-        <p:nvSpPr>
-          <p:cNvPr id="71" name="Rectangle 70"/>
-          <p:cNvSpPr/>
-          <p:nvPr/>
-        </p:nvSpPr>
-        <p:spPr>
-          <a:xfrm>
-            <a:off x="5530347" y="236629"/>
-            <a:ext cx="828000" cy="486353"/>
-          </a:xfrm>
-          <a:prstGeom prst="rect">
-            <a:avLst/>
-          </a:prstGeom>
-          <a:solidFill>
-            <a:srgbClr val="002060"/>
-          </a:solidFill>
-          <a:ln>
-            <a:noFill/>
-          </a:ln>
-        </p:spPr>
-        <p:style>
-          <a:lnRef idx="2">
-            <a:schemeClr val="accent1">
-              <a:shade val="50000"/>
-            </a:schemeClr>
-          </a:lnRef>
-          <a:fillRef idx="1">
-            <a:schemeClr val="accent1"/>
-          </a:fillRef>
-          <a:effectRef idx="0">
-            <a:schemeClr val="accent1"/>
-          </a:effectRef>
-          <a:fontRef idx="minor">
-            <a:schemeClr val="lt1"/>
-          </a:fontRef>
-        </p:style>
-        <p:txBody>
-          <a:bodyPr rtlCol="0" anchor="b"/>
-          <a:lstStyle/>
-          <a:p>
-            <a:pPr algn="r"/>
-            <a:endParaRPr lang="en-US" dirty="0">
-              <a:latin typeface="Segoe UI Light" panose="020B0502040204020203" pitchFamily="34" charset="0"/>
-              <a:cs typeface="Segoe UI Light" panose="020B0502040204020203" pitchFamily="34" charset="0"/>
-            </a:endParaRPr>
-          </a:p>
-        </p:txBody>
-      </p:sp>
       <p:pic>
         <p:nvPicPr>
-          <p:cNvPr id="80" name="Image 79"/>
+          <p:cNvPr id="81" name="Image 80"/>
           <p:cNvPicPr>
             <a:picLocks noChangeAspect="1"/>
           </p:cNvPicPr>
@@ -14864,36 +14845,6 @@
         </p:blipFill>
         <p:spPr>
           <a:xfrm>
-            <a:off x="6700436" y="294024"/>
-            <a:ext cx="391925" cy="391925"/>
-          </a:xfrm>
-          <a:prstGeom prst="rect">
-            <a:avLst/>
-          </a:prstGeom>
-        </p:spPr>
-      </p:pic>
-      <p:pic>
-        <p:nvPicPr>
-          <p:cNvPr id="81" name="Image 80"/>
-          <p:cNvPicPr>
-            <a:picLocks noChangeAspect="1"/>
-          </p:cNvPicPr>
-          <p:nvPr/>
-        </p:nvPicPr>
-        <p:blipFill>
-          <a:blip r:embed="rId7">
-            <a:extLst>
-              <a:ext uri="{28A0092B-C50C-407E-A947-70E740481C1C}">
-                <a14:useLocalDpi xmlns:a14="http://schemas.microsoft.com/office/drawing/2010/main" val="0"/>
-              </a:ext>
-            </a:extLst>
-          </a:blip>
-          <a:stretch>
-            <a:fillRect/>
-          </a:stretch>
-        </p:blipFill>
-        <p:spPr>
-          <a:xfrm>
             <a:off x="5717569" y="344036"/>
             <a:ext cx="282861" cy="282861"/>
           </a:xfrm>
@@ -14911,7 +14862,7 @@
           <p:nvPr/>
         </p:nvPicPr>
         <p:blipFill>
-          <a:blip r:embed="rId4" cstate="print">
+          <a:blip r:embed="rId7" cstate="print">
             <a:extLst>
               <a:ext uri="{28A0092B-C50C-407E-A947-70E740481C1C}">
                 <a14:useLocalDpi xmlns:a14="http://schemas.microsoft.com/office/drawing/2010/main" val="0"/>
@@ -15134,7 +15085,7 @@
                 <a:latin typeface="Segoe UI Light" panose="020B0502040204020203" pitchFamily="34" charset="0"/>
                 <a:cs typeface="Segoe UI Light" panose="020B0502040204020203" pitchFamily="34" charset="0"/>
               </a:rPr>
-              <a:t>Classique</a:t>
+              <a:t>Partition 1</a:t>
             </a:r>
             <a:endParaRPr lang="en-US" dirty="0">
               <a:latin typeface="Segoe UI Light" panose="020B0502040204020203" pitchFamily="34" charset="0"/>
@@ -15193,7 +15144,7 @@
                 <a:latin typeface="Segoe UI Light" panose="020B0502040204020203" pitchFamily="34" charset="0"/>
                 <a:cs typeface="Segoe UI Light" panose="020B0502040204020203" pitchFamily="34" charset="0"/>
               </a:rPr>
-              <a:t>Rock</a:t>
+              <a:t>Partition 2</a:t>
             </a:r>
             <a:endParaRPr lang="en-US" dirty="0">
               <a:latin typeface="Segoe UI Light" panose="020B0502040204020203" pitchFamily="34" charset="0"/>
@@ -15417,7 +15368,7 @@
                 <a:latin typeface="Segoe UI Light" panose="020B0502040204020203" pitchFamily="34" charset="0"/>
                 <a:cs typeface="Segoe UI Light" panose="020B0502040204020203" pitchFamily="34" charset="0"/>
               </a:rPr>
-              <a:t>Jazz</a:t>
+              <a:t>...</a:t>
             </a:r>
             <a:endParaRPr lang="en-US" dirty="0">
               <a:latin typeface="Segoe UI Light" panose="020B0502040204020203" pitchFamily="34" charset="0"/>
@@ -15476,7 +15427,7 @@
                 <a:latin typeface="Segoe UI Light" panose="020B0502040204020203" pitchFamily="34" charset="0"/>
                 <a:cs typeface="Segoe UI Light" panose="020B0502040204020203" pitchFamily="34" charset="0"/>
               </a:rPr>
-              <a:t>Pop</a:t>
+              <a:t>…</a:t>
             </a:r>
             <a:endParaRPr lang="en-US" dirty="0">
               <a:latin typeface="Segoe UI Light" panose="020B0502040204020203" pitchFamily="34" charset="0"/>
@@ -15662,7 +15613,7 @@
           <p:nvPr/>
         </p:nvPicPr>
         <p:blipFill>
-          <a:blip r:embed="rId6" cstate="print">
+          <a:blip r:embed="rId5" cstate="print">
             <a:extLst>
               <a:ext uri="{28A0092B-C50C-407E-A947-70E740481C1C}">
                 <a14:useLocalDpi xmlns:a14="http://schemas.microsoft.com/office/drawing/2010/main" val="0"/>
@@ -15692,7 +15643,7 @@
           <p:nvPr/>
         </p:nvPicPr>
         <p:blipFill>
-          <a:blip r:embed="rId6" cstate="print">
+          <a:blip r:embed="rId5" cstate="print">
             <a:extLst>
               <a:ext uri="{28A0092B-C50C-407E-A947-70E740481C1C}">
                 <a14:useLocalDpi xmlns:a14="http://schemas.microsoft.com/office/drawing/2010/main" val="0"/>
@@ -15722,7 +15673,7 @@
           <p:nvPr/>
         </p:nvPicPr>
         <p:blipFill>
-          <a:blip r:embed="rId6" cstate="print">
+          <a:blip r:embed="rId5" cstate="print">
             <a:extLst>
               <a:ext uri="{28A0092B-C50C-407E-A947-70E740481C1C}">
                 <a14:useLocalDpi xmlns:a14="http://schemas.microsoft.com/office/drawing/2010/main" val="0"/>
@@ -15752,7 +15703,7 @@
           <p:nvPr/>
         </p:nvPicPr>
         <p:blipFill>
-          <a:blip r:embed="rId6" cstate="print">
+          <a:blip r:embed="rId5" cstate="print">
             <a:extLst>
               <a:ext uri="{28A0092B-C50C-407E-A947-70E740481C1C}">
                 <a14:useLocalDpi xmlns:a14="http://schemas.microsoft.com/office/drawing/2010/main" val="0"/>
@@ -15767,6 +15718,96 @@
           <a:xfrm>
             <a:off x="3701140" y="2580900"/>
             <a:ext cx="248072" cy="248072"/>
+          </a:xfrm>
+          <a:prstGeom prst="rect">
+            <a:avLst/>
+          </a:prstGeom>
+        </p:spPr>
+      </p:pic>
+      <p:pic>
+        <p:nvPicPr>
+          <p:cNvPr id="3" name="Image 2"/>
+          <p:cNvPicPr>
+            <a:picLocks noChangeAspect="1"/>
+          </p:cNvPicPr>
+          <p:nvPr/>
+        </p:nvPicPr>
+        <p:blipFill>
+          <a:blip r:embed="rId10">
+            <a:extLst>
+              <a:ext uri="{28A0092B-C50C-407E-A947-70E740481C1C}">
+                <a14:useLocalDpi xmlns:a14="http://schemas.microsoft.com/office/drawing/2010/main" val="0"/>
+              </a:ext>
+            </a:extLst>
+          </a:blip>
+          <a:stretch>
+            <a:fillRect/>
+          </a:stretch>
+        </p:blipFill>
+        <p:spPr>
+          <a:xfrm>
+            <a:off x="5687437" y="5713033"/>
+            <a:ext cx="325148" cy="325148"/>
+          </a:xfrm>
+          <a:prstGeom prst="rect">
+            <a:avLst/>
+          </a:prstGeom>
+        </p:spPr>
+      </p:pic>
+      <p:pic>
+        <p:nvPicPr>
+          <p:cNvPr id="46" name="Image 45"/>
+          <p:cNvPicPr>
+            <a:picLocks noChangeAspect="1"/>
+          </p:cNvPicPr>
+          <p:nvPr/>
+        </p:nvPicPr>
+        <p:blipFill>
+          <a:blip r:embed="rId10">
+            <a:extLst>
+              <a:ext uri="{28A0092B-C50C-407E-A947-70E740481C1C}">
+                <a14:useLocalDpi xmlns:a14="http://schemas.microsoft.com/office/drawing/2010/main" val="0"/>
+              </a:ext>
+            </a:extLst>
+          </a:blip>
+          <a:stretch>
+            <a:fillRect/>
+          </a:stretch>
+        </p:blipFill>
+        <p:spPr>
+          <a:xfrm>
+            <a:off x="7324311" y="5713033"/>
+            <a:ext cx="325148" cy="325148"/>
+          </a:xfrm>
+          <a:prstGeom prst="rect">
+            <a:avLst/>
+          </a:prstGeom>
+        </p:spPr>
+      </p:pic>
+      <p:pic>
+        <p:nvPicPr>
+          <p:cNvPr id="47" name="Image 46"/>
+          <p:cNvPicPr>
+            <a:picLocks noChangeAspect="1"/>
+          </p:cNvPicPr>
+          <p:nvPr/>
+        </p:nvPicPr>
+        <p:blipFill>
+          <a:blip r:embed="rId10">
+            <a:extLst>
+              <a:ext uri="{28A0092B-C50C-407E-A947-70E740481C1C}">
+                <a14:useLocalDpi xmlns:a14="http://schemas.microsoft.com/office/drawing/2010/main" val="0"/>
+              </a:ext>
+            </a:extLst>
+          </a:blip>
+          <a:stretch>
+            <a:fillRect/>
+          </a:stretch>
+        </p:blipFill>
+        <p:spPr>
+          <a:xfrm>
+            <a:off x="4098158" y="5715899"/>
+            <a:ext cx="325148" cy="325148"/>
           </a:xfrm>
           <a:prstGeom prst="rect">
             <a:avLst/>

</xml_diff>

<commit_message>
Amélioration code et visuel
</commit_message>
<xml_diff>
--- a/Administratif/Visuel/Visuel.pptx
+++ b/Administratif/Visuel/Visuel.pptx
@@ -205,7 +205,7 @@
           <a:p>
             <a:fld id="{1226F8A9-A3C3-454C-80DE-58F97EE8E331}" type="datetimeFigureOut">
               <a:rPr lang="fr-CH" smtClean="0"/>
-              <a:t>01.07.2016</a:t>
+              <a:t>04.07.2016</a:t>
             </a:fld>
             <a:endParaRPr lang="fr-CH"/>
           </a:p>
@@ -688,7 +688,7 @@
           <a:p>
             <a:fld id="{A5DE0357-5E3B-455B-85D6-97D04540FA5A}" type="datetimeFigureOut">
               <a:rPr lang="en-US" smtClean="0"/>
-              <a:t>7/1/2016</a:t>
+              <a:t>7/4/2016</a:t>
             </a:fld>
             <a:endParaRPr lang="en-US"/>
           </a:p>
@@ -858,7 +858,7 @@
           <a:p>
             <a:fld id="{A5DE0357-5E3B-455B-85D6-97D04540FA5A}" type="datetimeFigureOut">
               <a:rPr lang="en-US" smtClean="0"/>
-              <a:t>7/1/2016</a:t>
+              <a:t>7/4/2016</a:t>
             </a:fld>
             <a:endParaRPr lang="en-US"/>
           </a:p>
@@ -1038,7 +1038,7 @@
           <a:p>
             <a:fld id="{A5DE0357-5E3B-455B-85D6-97D04540FA5A}" type="datetimeFigureOut">
               <a:rPr lang="en-US" smtClean="0"/>
-              <a:t>7/1/2016</a:t>
+              <a:t>7/4/2016</a:t>
             </a:fld>
             <a:endParaRPr lang="en-US"/>
           </a:p>
@@ -1208,7 +1208,7 @@
           <a:p>
             <a:fld id="{A5DE0357-5E3B-455B-85D6-97D04540FA5A}" type="datetimeFigureOut">
               <a:rPr lang="en-US" smtClean="0"/>
-              <a:t>7/1/2016</a:t>
+              <a:t>7/4/2016</a:t>
             </a:fld>
             <a:endParaRPr lang="en-US"/>
           </a:p>
@@ -1454,7 +1454,7 @@
           <a:p>
             <a:fld id="{A5DE0357-5E3B-455B-85D6-97D04540FA5A}" type="datetimeFigureOut">
               <a:rPr lang="en-US" smtClean="0"/>
-              <a:t>7/1/2016</a:t>
+              <a:t>7/4/2016</a:t>
             </a:fld>
             <a:endParaRPr lang="en-US"/>
           </a:p>
@@ -1686,7 +1686,7 @@
           <a:p>
             <a:fld id="{A5DE0357-5E3B-455B-85D6-97D04540FA5A}" type="datetimeFigureOut">
               <a:rPr lang="en-US" smtClean="0"/>
-              <a:t>7/1/2016</a:t>
+              <a:t>7/4/2016</a:t>
             </a:fld>
             <a:endParaRPr lang="en-US"/>
           </a:p>
@@ -2053,7 +2053,7 @@
           <a:p>
             <a:fld id="{A5DE0357-5E3B-455B-85D6-97D04540FA5A}" type="datetimeFigureOut">
               <a:rPr lang="en-US" smtClean="0"/>
-              <a:t>7/1/2016</a:t>
+              <a:t>7/4/2016</a:t>
             </a:fld>
             <a:endParaRPr lang="en-US"/>
           </a:p>
@@ -2171,7 +2171,7 @@
           <a:p>
             <a:fld id="{A5DE0357-5E3B-455B-85D6-97D04540FA5A}" type="datetimeFigureOut">
               <a:rPr lang="en-US" smtClean="0"/>
-              <a:t>7/1/2016</a:t>
+              <a:t>7/4/2016</a:t>
             </a:fld>
             <a:endParaRPr lang="en-US"/>
           </a:p>
@@ -2266,7 +2266,7 @@
           <a:p>
             <a:fld id="{A5DE0357-5E3B-455B-85D6-97D04540FA5A}" type="datetimeFigureOut">
               <a:rPr lang="en-US" smtClean="0"/>
-              <a:t>7/1/2016</a:t>
+              <a:t>7/4/2016</a:t>
             </a:fld>
             <a:endParaRPr lang="en-US"/>
           </a:p>
@@ -2543,7 +2543,7 @@
           <a:p>
             <a:fld id="{A5DE0357-5E3B-455B-85D6-97D04540FA5A}" type="datetimeFigureOut">
               <a:rPr lang="en-US" smtClean="0"/>
-              <a:t>7/1/2016</a:t>
+              <a:t>7/4/2016</a:t>
             </a:fld>
             <a:endParaRPr lang="en-US"/>
           </a:p>
@@ -2796,7 +2796,7 @@
           <a:p>
             <a:fld id="{A5DE0357-5E3B-455B-85D6-97D04540FA5A}" type="datetimeFigureOut">
               <a:rPr lang="en-US" smtClean="0"/>
-              <a:t>7/1/2016</a:t>
+              <a:t>7/4/2016</a:t>
             </a:fld>
             <a:endParaRPr lang="en-US"/>
           </a:p>
@@ -3009,7 +3009,7 @@
           <a:p>
             <a:fld id="{A5DE0357-5E3B-455B-85D6-97D04540FA5A}" type="datetimeFigureOut">
               <a:rPr lang="en-US" smtClean="0"/>
-              <a:t>7/1/2016</a:t>
+              <a:t>7/4/2016</a:t>
             </a:fld>
             <a:endParaRPr lang="en-US"/>
           </a:p>
@@ -4544,9 +4544,59 @@
           </a:prstGeom>
         </p:spPr>
       </p:pic>
+      <p:sp>
+        <p:nvSpPr>
+          <p:cNvPr id="44" name="Rectangle 43"/>
+          <p:cNvSpPr/>
+          <p:nvPr/>
+        </p:nvSpPr>
+        <p:spPr>
+          <a:xfrm>
+            <a:off x="3626243" y="6270388"/>
+            <a:ext cx="4636208" cy="223177"/>
+          </a:xfrm>
+          <a:prstGeom prst="rect">
+            <a:avLst/>
+          </a:prstGeom>
+          <a:solidFill>
+            <a:srgbClr val="002060"/>
+          </a:solidFill>
+          <a:ln>
+            <a:noFill/>
+          </a:ln>
+        </p:spPr>
+        <p:style>
+          <a:lnRef idx="2">
+            <a:schemeClr val="accent1">
+              <a:shade val="50000"/>
+            </a:schemeClr>
+          </a:lnRef>
+          <a:fillRef idx="1">
+            <a:schemeClr val="accent1"/>
+          </a:fillRef>
+          <a:effectRef idx="0">
+            <a:schemeClr val="accent1"/>
+          </a:effectRef>
+          <a:fontRef idx="minor">
+            <a:schemeClr val="lt1"/>
+          </a:fontRef>
+        </p:style>
+        <p:txBody>
+          <a:bodyPr rtlCol="0" anchor="ctr"/>
+          <a:lstStyle/>
+          <a:p>
+            <a:pPr algn="r"/>
+            <a:r>
+              <a:rPr lang="fr-CH"/>
+              <a:t>Salomon Quentin</a:t>
+            </a:r>
+            <a:endParaRPr lang="fr-CH" dirty="0"/>
+          </a:p>
+        </p:txBody>
+      </p:sp>
       <p:pic>
         <p:nvPicPr>
-          <p:cNvPr id="13" name="Picture 2" descr="https://www.y-parc.ch/uploads/pics/20151121_image_event_po-heig-vd.png"/>
+          <p:cNvPr id="40" name="Picture 2" descr="https://www.y-parc.ch/uploads/pics/20151121_image_event_po-heig-vd.png"/>
           <p:cNvPicPr>
             <a:picLocks noChangeAspect="1" noChangeArrowheads="1"/>
           </p:cNvPicPr>
@@ -4554,6 +4604,16 @@
         </p:nvPicPr>
         <p:blipFill>
           <a:blip r:embed="rId16" cstate="print">
+            <a:clrChange>
+              <a:clrFrom>
+                <a:srgbClr val="FFFFFF"/>
+              </a:clrFrom>
+              <a:clrTo>
+                <a:srgbClr val="FFFFFF">
+                  <a:alpha val="0"/>
+                </a:srgbClr>
+              </a:clrTo>
+            </a:clrChange>
             <a:extLst>
               <a:ext uri="{28A0092B-C50C-407E-A947-70E740481C1C}">
                 <a14:useLocalDpi xmlns:a14="http://schemas.microsoft.com/office/drawing/2010/main" val="0"/>
@@ -4567,8 +4627,8 @@
         </p:blipFill>
         <p:spPr bwMode="auto">
           <a:xfrm>
-            <a:off x="6848491" y="1874486"/>
-            <a:ext cx="1413960" cy="585087"/>
+            <a:off x="6537281" y="1709530"/>
+            <a:ext cx="1782388" cy="893489"/>
           </a:xfrm>
           <a:prstGeom prst="rect">
             <a:avLst/>
@@ -4585,56 +4645,6 @@
           </a:extLst>
         </p:spPr>
       </p:pic>
-      <p:sp>
-        <p:nvSpPr>
-          <p:cNvPr id="44" name="Rectangle 43"/>
-          <p:cNvSpPr/>
-          <p:nvPr/>
-        </p:nvSpPr>
-        <p:spPr>
-          <a:xfrm>
-            <a:off x="3626243" y="6270388"/>
-            <a:ext cx="4636208" cy="223177"/>
-          </a:xfrm>
-          <a:prstGeom prst="rect">
-            <a:avLst/>
-          </a:prstGeom>
-          <a:solidFill>
-            <a:srgbClr val="002060"/>
-          </a:solidFill>
-          <a:ln>
-            <a:noFill/>
-          </a:ln>
-        </p:spPr>
-        <p:style>
-          <a:lnRef idx="2">
-            <a:schemeClr val="accent1">
-              <a:shade val="50000"/>
-            </a:schemeClr>
-          </a:lnRef>
-          <a:fillRef idx="1">
-            <a:schemeClr val="accent1"/>
-          </a:fillRef>
-          <a:effectRef idx="0">
-            <a:schemeClr val="accent1"/>
-          </a:effectRef>
-          <a:fontRef idx="minor">
-            <a:schemeClr val="lt1"/>
-          </a:fontRef>
-        </p:style>
-        <p:txBody>
-          <a:bodyPr rtlCol="0" anchor="ctr"/>
-          <a:lstStyle/>
-          <a:p>
-            <a:pPr algn="r"/>
-            <a:r>
-              <a:rPr lang="fr-CH"/>
-              <a:t>Salomon Quentin</a:t>
-            </a:r>
-            <a:endParaRPr lang="fr-CH" dirty="0"/>
-          </a:p>
-        </p:txBody>
-      </p:sp>
     </p:spTree>
     <p:extLst>
       <p:ext uri="{BB962C8B-B14F-4D97-AF65-F5344CB8AC3E}">

</xml_diff>